<commit_message>
Revert "Merge branch 'master' into Jisun"
This reverts commit b8e6fa7467ebe30127fc10b7984c9ccf403af0af, reversing
changes made to b23044d0a70e613f9d1abce3e2752da182f62f8e.
</commit_message>
<xml_diff>
--- a/보고서/클래스설계서_Final_Project.pptx
+++ b/보고서/클래스설계서_Final_Project.pptx
@@ -9,40 +9,31 @@
     <p:sldId id="257" r:id="rId3"/>
     <p:sldId id="258" r:id="rId4"/>
     <p:sldId id="301" r:id="rId5"/>
-    <p:sldId id="302" r:id="rId6"/>
-    <p:sldId id="304" r:id="rId7"/>
-    <p:sldId id="306" r:id="rId8"/>
-    <p:sldId id="307" r:id="rId9"/>
-    <p:sldId id="308" r:id="rId10"/>
-    <p:sldId id="309" r:id="rId11"/>
-    <p:sldId id="310" r:id="rId12"/>
-    <p:sldId id="303" r:id="rId13"/>
-    <p:sldId id="305" r:id="rId14"/>
-    <p:sldId id="318" r:id="rId15"/>
-    <p:sldId id="319" r:id="rId16"/>
-    <p:sldId id="320" r:id="rId17"/>
-    <p:sldId id="321" r:id="rId18"/>
-    <p:sldId id="322" r:id="rId19"/>
-    <p:sldId id="323" r:id="rId20"/>
-    <p:sldId id="324" r:id="rId21"/>
-    <p:sldId id="311" r:id="rId22"/>
-    <p:sldId id="312" r:id="rId23"/>
-    <p:sldId id="315" r:id="rId24"/>
-    <p:sldId id="316" r:id="rId25"/>
-    <p:sldId id="317" r:id="rId26"/>
-    <p:sldId id="313" r:id="rId27"/>
-    <p:sldId id="314" r:id="rId28"/>
+    <p:sldId id="311" r:id="rId6"/>
+    <p:sldId id="312" r:id="rId7"/>
+    <p:sldId id="313" r:id="rId8"/>
+    <p:sldId id="314" r:id="rId9"/>
+    <p:sldId id="315" r:id="rId10"/>
+    <p:sldId id="302" r:id="rId11"/>
+    <p:sldId id="304" r:id="rId12"/>
+    <p:sldId id="306" r:id="rId13"/>
+    <p:sldId id="307" r:id="rId14"/>
+    <p:sldId id="308" r:id="rId15"/>
+    <p:sldId id="309" r:id="rId16"/>
+    <p:sldId id="310" r:id="rId17"/>
+    <p:sldId id="303" r:id="rId18"/>
+    <p:sldId id="305" r:id="rId19"/>
   </p:sldIdLst>
   <p:sldSz cx="12192000" cy="6858000"/>
   <p:notesSz cx="6858000" cy="9144000"/>
   <p:embeddedFontLst>
     <p:embeddedFont>
       <p:font typeface="THE정고딕150" pitchFamily="18" charset="-127"/>
-      <p:regular r:id="rId29"/>
+      <p:regular r:id="rId20"/>
     </p:embeddedFont>
     <p:embeddedFont>
       <p:font typeface="THE정고딕130" pitchFamily="18" charset="-127"/>
-      <p:regular r:id="rId30"/>
+      <p:regular r:id="rId21"/>
     </p:embeddedFont>
   </p:embeddedFontLst>
   <p:defaultTextStyle>
@@ -142,7 +133,7 @@
   </p:defaultTextStyle>
   <p:extLst>
     <p:ext uri="{EFAFB233-063F-42B5-8137-9DF3F51BA10A}">
-      <p15:sldGuideLst xmlns:p15="http://schemas.microsoft.com/office/powerpoint/2012/main" xmlns:p14="http://schemas.microsoft.com/office/powerpoint/2010/main" xmlns="">
+      <p15:sldGuideLst xmlns="" xmlns:p14="http://schemas.microsoft.com/office/powerpoint/2010/main" xmlns:p15="http://schemas.microsoft.com/office/powerpoint/2012/main">
         <p15:guide id="0" orient="horz" pos="2157" userDrawn="1">
           <p15:clr>
             <a:srgbClr val="A4A3A4"/>
@@ -304,7 +295,7 @@
           <a:p>
             <a:fld id="{2AFE6DCD-4700-455A-AD6D-3C42515F5C57}" type="datetimeFigureOut">
               <a:rPr lang="ko-KR" altLang="en-US" smtClean="0"/>
-              <a:t>2017-12-03</a:t>
+              <a:t>2017-12-02</a:t>
             </a:fld>
             <a:endParaRPr lang="ko-KR" altLang="en-US"/>
           </a:p>
@@ -482,7 +473,7 @@
           <a:p>
             <a:fld id="{2AFE6DCD-4700-455A-AD6D-3C42515F5C57}" type="datetimeFigureOut">
               <a:rPr lang="ko-KR" altLang="en-US" smtClean="0"/>
-              <a:t>2017-12-03</a:t>
+              <a:t>2017-12-02</a:t>
             </a:fld>
             <a:endParaRPr lang="ko-KR" altLang="en-US"/>
           </a:p>
@@ -672,7 +663,7 @@
           <a:p>
             <a:fld id="{2AFE6DCD-4700-455A-AD6D-3C42515F5C57}" type="datetimeFigureOut">
               <a:rPr lang="ko-KR" altLang="en-US" smtClean="0"/>
-              <a:t>2017-12-03</a:t>
+              <a:t>2017-12-02</a:t>
             </a:fld>
             <a:endParaRPr lang="ko-KR" altLang="en-US"/>
           </a:p>
@@ -840,7 +831,7 @@
           <a:p>
             <a:fld id="{2AFE6DCD-4700-455A-AD6D-3C42515F5C57}" type="datetimeFigureOut">
               <a:rPr lang="ko-KR" altLang="en-US" smtClean="0"/>
-              <a:t>2017-12-03</a:t>
+              <a:t>2017-12-02</a:t>
             </a:fld>
             <a:endParaRPr lang="ko-KR" altLang="en-US"/>
           </a:p>
@@ -1085,7 +1076,7 @@
           <a:p>
             <a:fld id="{2AFE6DCD-4700-455A-AD6D-3C42515F5C57}" type="datetimeFigureOut">
               <a:rPr lang="ko-KR" altLang="en-US" smtClean="0"/>
-              <a:t>2017-12-03</a:t>
+              <a:t>2017-12-02</a:t>
             </a:fld>
             <a:endParaRPr lang="ko-KR" altLang="en-US"/>
           </a:p>
@@ -1314,7 +1305,7 @@
           <a:p>
             <a:fld id="{2AFE6DCD-4700-455A-AD6D-3C42515F5C57}" type="datetimeFigureOut">
               <a:rPr lang="ko-KR" altLang="en-US" smtClean="0"/>
-              <a:t>2017-12-03</a:t>
+              <a:t>2017-12-02</a:t>
             </a:fld>
             <a:endParaRPr lang="ko-KR" altLang="en-US"/>
           </a:p>
@@ -1678,7 +1669,7 @@
           <a:p>
             <a:fld id="{2AFE6DCD-4700-455A-AD6D-3C42515F5C57}" type="datetimeFigureOut">
               <a:rPr lang="ko-KR" altLang="en-US" smtClean="0"/>
-              <a:t>2017-12-03</a:t>
+              <a:t>2017-12-02</a:t>
             </a:fld>
             <a:endParaRPr lang="ko-KR" altLang="en-US"/>
           </a:p>
@@ -1799,7 +1790,7 @@
           <p:cNvPr id="8" name="직사각형 7">
             <a:extLst>
               <a:ext uri="{FF2B5EF4-FFF2-40B4-BE49-F238E27FC236}">
-                <a16:creationId xmlns="" xmlns:a16="http://schemas.microsoft.com/office/drawing/2014/main" id="{EC9D3B80-2639-45EA-95B5-D9EAD7F532D5}"/>
+                <a16:creationId xmlns:a16="http://schemas.microsoft.com/office/drawing/2014/main" xmlns="" id="{EC9D3B80-2639-45EA-95B5-D9EAD7F532D5}"/>
               </a:ext>
             </a:extLst>
           </p:cNvPr>
@@ -2169,7 +2160,7 @@
           <a:p>
             <a:fld id="{2AFE6DCD-4700-455A-AD6D-3C42515F5C57}" type="datetimeFigureOut">
               <a:rPr lang="ko-KR" altLang="en-US" smtClean="0"/>
-              <a:t>2017-12-03</a:t>
+              <a:t>2017-12-02</a:t>
             </a:fld>
             <a:endParaRPr lang="ko-KR" altLang="en-US"/>
           </a:p>
@@ -2383,7 +2374,7 @@
             <a:fld id="{2AFE6DCD-4700-455A-AD6D-3C42515F5C57}" type="datetimeFigureOut">
               <a:rPr lang="ko-KR" altLang="en-US" smtClean="0"/>
               <a:pPr/>
-              <a:t>2017-12-03</a:t>
+              <a:t>2017-12-02</a:t>
             </a:fld>
             <a:endParaRPr lang="ko-KR" altLang="en-US"/>
           </a:p>
@@ -3045,6 +3036,770 @@
 <file path=ppt/slides/slide10.xml><?xml version="1.0" encoding="utf-8"?>
 <p:sld xmlns:a="http://schemas.openxmlformats.org/drawingml/2006/main" xmlns:r="http://schemas.openxmlformats.org/officeDocument/2006/relationships" xmlns:p="http://schemas.openxmlformats.org/presentationml/2006/main">
   <p:cSld>
+    <p:bg>
+      <p:bgPr>
+        <a:solidFill>
+          <a:srgbClr val="212121"/>
+        </a:solidFill>
+        <a:effectLst/>
+      </p:bgPr>
+    </p:bg>
+    <p:spTree>
+      <p:nvGrpSpPr>
+        <p:cNvPr id="1" name=""/>
+        <p:cNvGrpSpPr/>
+        <p:nvPr/>
+      </p:nvGrpSpPr>
+      <p:grpSpPr>
+        <a:xfrm>
+          <a:off x="0" y="0"/>
+          <a:ext cx="0" cy="0"/>
+          <a:chOff x="0" y="0"/>
+          <a:chExt cx="0" cy="0"/>
+        </a:xfrm>
+      </p:grpSpPr>
+      <p:grpSp>
+        <p:nvGrpSpPr>
+          <p:cNvPr id="2" name="그룹 1">
+            <a:extLst>
+              <a:ext uri="{FF2B5EF4-FFF2-40B4-BE49-F238E27FC236}">
+                <a16:creationId xmlns:p14="http://schemas.microsoft.com/office/powerpoint/2010/main" xmlns:a16="http://schemas.microsoft.com/office/drawing/2014/main" xmlns="" id="{C71E5FE6-3E6D-4092-81AA-962DB5284ABF}"/>
+              </a:ext>
+            </a:extLst>
+          </p:cNvPr>
+          <p:cNvGrpSpPr/>
+          <p:nvPr/>
+        </p:nvGrpSpPr>
+        <p:grpSpPr>
+          <a:xfrm>
+            <a:off x="4598353" y="2980372"/>
+            <a:ext cx="3757365" cy="564515"/>
+            <a:chOff x="4598353" y="2980372"/>
+            <a:chExt cx="3757365" cy="564515"/>
+          </a:xfrm>
+        </p:grpSpPr>
+        <p:sp>
+          <p:nvSpPr>
+            <p:cNvPr id="30" name="타원 29"/>
+            <p:cNvSpPr/>
+            <p:nvPr/>
+          </p:nvSpPr>
+          <p:spPr>
+            <a:xfrm>
+              <a:off x="4598353" y="2980372"/>
+              <a:ext cx="564832" cy="564515"/>
+            </a:xfrm>
+            <a:prstGeom prst="ellipse">
+              <a:avLst/>
+            </a:prstGeom>
+            <a:solidFill>
+              <a:schemeClr val="bg1"/>
+            </a:solidFill>
+            <a:ln>
+              <a:noFill/>
+            </a:ln>
+          </p:spPr>
+          <p:style>
+            <a:lnRef idx="2">
+              <a:schemeClr val="accent1">
+                <a:shade val="50000"/>
+              </a:schemeClr>
+            </a:lnRef>
+            <a:fillRef idx="1">
+              <a:schemeClr val="accent1"/>
+            </a:fillRef>
+            <a:effectRef idx="0">
+              <a:schemeClr val="accent1"/>
+            </a:effectRef>
+            <a:fontRef idx="minor">
+              <a:schemeClr val="lt1"/>
+            </a:fontRef>
+          </p:style>
+          <p:txBody>
+            <a:bodyPr rtlCol="0" anchor="ctr"/>
+            <a:lstStyle/>
+            <a:p>
+              <a:pPr algn="ctr"/>
+              <a:r>
+                <a:rPr lang="en-US" altLang="ko-KR" sz="2800" b="1">
+                  <a:solidFill>
+                    <a:schemeClr val="tx1"/>
+                  </a:solidFill>
+                  <a:latin typeface="THE정고딕130" panose="02020603020101020101" pitchFamily="18" charset="-127"/>
+                  <a:ea typeface="THE정고딕130" panose="02020603020101020101" pitchFamily="18" charset="-127"/>
+                </a:rPr>
+                <a:t>2</a:t>
+              </a:r>
+              <a:endParaRPr lang="ko-KR" altLang="en-US" sz="2800" b="1">
+                <a:solidFill>
+                  <a:schemeClr val="tx1"/>
+                </a:solidFill>
+                <a:latin typeface="THE정고딕130" panose="02020603020101020101" pitchFamily="18" charset="-127"/>
+                <a:ea typeface="THE정고딕130" panose="02020603020101020101" pitchFamily="18" charset="-127"/>
+              </a:endParaRPr>
+            </a:p>
+          </p:txBody>
+        </p:sp>
+        <p:sp>
+          <p:nvSpPr>
+            <p:cNvPr id="6" name="TextBox 5">
+              <a:extLst>
+                <a:ext uri="{FF2B5EF4-FFF2-40B4-BE49-F238E27FC236}">
+                  <a16:creationId xmlns:p14="http://schemas.microsoft.com/office/powerpoint/2010/main" xmlns:a16="http://schemas.microsoft.com/office/drawing/2014/main" xmlns="" id="{BCB0E9E3-FAB5-4E31-83EE-08A0FE55BB4A}"/>
+                </a:ext>
+              </a:extLst>
+            </p:cNvPr>
+            <p:cNvSpPr txBox="1"/>
+            <p:nvPr/>
+          </p:nvSpPr>
+          <p:spPr>
+            <a:xfrm>
+              <a:off x="5295265" y="3001010"/>
+              <a:ext cx="3060453" cy="523220"/>
+            </a:xfrm>
+            <a:prstGeom prst="rect">
+              <a:avLst/>
+            </a:prstGeom>
+            <a:noFill/>
+          </p:spPr>
+          <p:txBody>
+            <a:bodyPr wrap="none" rtlCol="0">
+              <a:spAutoFit/>
+            </a:bodyPr>
+            <a:lstStyle/>
+            <a:p>
+              <a:r>
+                <a:rPr lang="ko-KR" altLang="en-US" sz="2800" smtClean="0">
+                  <a:solidFill>
+                    <a:schemeClr val="bg1"/>
+                  </a:solidFill>
+                  <a:latin typeface="+mj-ea"/>
+                  <a:ea typeface="+mj-ea"/>
+                </a:rPr>
+                <a:t>클래스 다이어그램</a:t>
+              </a:r>
+              <a:endParaRPr lang="en-US" altLang="ko-KR" sz="2800">
+                <a:solidFill>
+                  <a:schemeClr val="bg1"/>
+                </a:solidFill>
+                <a:latin typeface="+mj-ea"/>
+                <a:ea typeface="+mj-ea"/>
+              </a:endParaRPr>
+            </a:p>
+          </p:txBody>
+        </p:sp>
+      </p:grpSp>
+    </p:spTree>
+    <p:extLst>
+      <p:ext uri="{BB962C8B-B14F-4D97-AF65-F5344CB8AC3E}">
+        <p14:creationId xmlns:p14="http://schemas.microsoft.com/office/powerpoint/2010/main" val="693951829"/>
+      </p:ext>
+    </p:extLst>
+  </p:cSld>
+  <p:clrMapOvr>
+    <a:masterClrMapping/>
+  </p:clrMapOvr>
+  <mc:AlternateContent xmlns:mc="http://schemas.openxmlformats.org/markup-compatibility/2006" xmlns:p14="http://schemas.microsoft.com/office/powerpoint/2010/main">
+    <mc:Choice Requires="p14">
+      <p:transition spd="slow" p14:dur="2000"/>
+    </mc:Choice>
+    <mc:Fallback xmlns="">
+      <p:transition spd="slow"/>
+    </mc:Fallback>
+  </mc:AlternateContent>
+  <p:timing>
+    <p:tnLst>
+      <p:par>
+        <p:cTn id="1" dur="indefinite" restart="never" nodeType="tmRoot"/>
+      </p:par>
+    </p:tnLst>
+  </p:timing>
+</p:sld>
+</file>
+
+<file path=ppt/slides/slide11.xml><?xml version="1.0" encoding="utf-8"?>
+<p:sld xmlns:a="http://schemas.openxmlformats.org/drawingml/2006/main" xmlns:r="http://schemas.openxmlformats.org/officeDocument/2006/relationships" xmlns:p="http://schemas.openxmlformats.org/presentationml/2006/main">
+  <p:cSld>
+    <p:spTree>
+      <p:nvGrpSpPr>
+        <p:cNvPr id="1" name=""/>
+        <p:cNvGrpSpPr/>
+        <p:nvPr/>
+      </p:nvGrpSpPr>
+      <p:grpSpPr>
+        <a:xfrm>
+          <a:off x="0" y="0"/>
+          <a:ext cx="0" cy="0"/>
+          <a:chOff x="0" y="0"/>
+          <a:chExt cx="0" cy="0"/>
+        </a:xfrm>
+      </p:grpSpPr>
+      <p:sp>
+        <p:nvSpPr>
+          <p:cNvPr id="4" name="제목 3"/>
+          <p:cNvSpPr>
+            <a:spLocks noGrp="1"/>
+          </p:cNvSpPr>
+          <p:nvPr>
+            <p:ph type="title"/>
+          </p:nvPr>
+        </p:nvSpPr>
+        <p:spPr>
+          <a:xfrm>
+            <a:off x="250190" y="0"/>
+            <a:ext cx="3373755" cy="650875"/>
+          </a:xfrm>
+        </p:spPr>
+        <p:txBody>
+          <a:bodyPr anchor="ctr">
+            <a:normAutofit/>
+          </a:bodyPr>
+          <a:lstStyle/>
+          <a:p>
+            <a:pPr lvl="0">
+              <a:defRPr/>
+            </a:pPr>
+            <a:r>
+              <a:rPr lang="ko-KR" altLang="en-US" sz="2800" smtClean="0"/>
+              <a:t>클래스 다이어그램</a:t>
+            </a:r>
+            <a:endParaRPr lang="ko-KR" altLang="en-US" sz="2800"/>
+          </a:p>
+        </p:txBody>
+      </p:sp>
+      <p:sp>
+        <p:nvSpPr>
+          <p:cNvPr id="5" name="텍스트 개체 틀 4"/>
+          <p:cNvSpPr>
+            <a:spLocks noGrp="1"/>
+          </p:cNvSpPr>
+          <p:nvPr>
+            <p:ph type="body" sz="half" idx="2"/>
+          </p:nvPr>
+        </p:nvSpPr>
+        <p:spPr>
+          <a:xfrm>
+            <a:off x="3424555" y="0"/>
+            <a:ext cx="3931920" cy="650875"/>
+          </a:xfrm>
+        </p:spPr>
+        <p:txBody>
+          <a:bodyPr anchor="ctr">
+            <a:normAutofit/>
+          </a:bodyPr>
+          <a:lstStyle/>
+          <a:p>
+            <a:pPr lvl="0">
+              <a:defRPr/>
+            </a:pPr>
+            <a:r>
+              <a:rPr lang="en-US" altLang="ko-KR" smtClean="0"/>
+              <a:t>User</a:t>
+            </a:r>
+            <a:endParaRPr lang="ko-KR" altLang="en-US"/>
+          </a:p>
+        </p:txBody>
+      </p:sp>
+      <p:pic>
+        <p:nvPicPr>
+          <p:cNvPr id="1026" name="Picture 2" descr="C:\Users\DongKyun\Documents\GitHub\KHFinalProject\보고서\클래스\user클래스.jpg"/>
+          <p:cNvPicPr>
+            <a:picLocks noChangeAspect="1" noChangeArrowheads="1"/>
+          </p:cNvPicPr>
+          <p:nvPr/>
+        </p:nvPicPr>
+        <p:blipFill>
+          <a:blip r:embed="rId2">
+            <a:extLst>
+              <a:ext uri="{28A0092B-C50C-407E-A947-70E740481C1C}">
+                <a14:useLocalDpi xmlns:a14="http://schemas.microsoft.com/office/drawing/2010/main" val="0"/>
+              </a:ext>
+            </a:extLst>
+          </a:blip>
+          <a:srcRect/>
+          <a:stretch>
+            <a:fillRect/>
+          </a:stretch>
+        </p:blipFill>
+        <p:spPr bwMode="auto">
+          <a:xfrm>
+            <a:off x="733425" y="787400"/>
+            <a:ext cx="10839450" cy="5969000"/>
+          </a:xfrm>
+          <a:prstGeom prst="rect">
+            <a:avLst/>
+          </a:prstGeom>
+          <a:noFill/>
+          <a:extLst>
+            <a:ext uri="{909E8E84-426E-40DD-AFC4-6F175D3DCCD1}">
+              <a14:hiddenFill xmlns:a14="http://schemas.microsoft.com/office/drawing/2010/main">
+                <a:solidFill>
+                  <a:srgbClr val="FFFFFF"/>
+                </a:solidFill>
+              </a14:hiddenFill>
+            </a:ext>
+          </a:extLst>
+        </p:spPr>
+      </p:pic>
+    </p:spTree>
+    <p:extLst>
+      <p:ext uri="{BB962C8B-B14F-4D97-AF65-F5344CB8AC3E}">
+        <p14:creationId xmlns:p14="http://schemas.microsoft.com/office/powerpoint/2010/main" val="1953278713"/>
+      </p:ext>
+    </p:extLst>
+  </p:cSld>
+  <p:clrMapOvr>
+    <a:masterClrMapping/>
+  </p:clrMapOvr>
+  <p:transition/>
+  <p:timing>
+    <p:tnLst>
+      <p:par>
+        <p:cTn id="1" dur="indefinite" restart="never" nodeType="tmRoot"/>
+      </p:par>
+    </p:tnLst>
+  </p:timing>
+</p:sld>
+</file>
+
+<file path=ppt/slides/slide12.xml><?xml version="1.0" encoding="utf-8"?>
+<p:sld xmlns:a="http://schemas.openxmlformats.org/drawingml/2006/main" xmlns:r="http://schemas.openxmlformats.org/officeDocument/2006/relationships" xmlns:p="http://schemas.openxmlformats.org/presentationml/2006/main">
+  <p:cSld>
+    <p:spTree>
+      <p:nvGrpSpPr>
+        <p:cNvPr id="1" name=""/>
+        <p:cNvGrpSpPr/>
+        <p:nvPr/>
+      </p:nvGrpSpPr>
+      <p:grpSpPr>
+        <a:xfrm>
+          <a:off x="0" y="0"/>
+          <a:ext cx="0" cy="0"/>
+          <a:chOff x="0" y="0"/>
+          <a:chExt cx="0" cy="0"/>
+        </a:xfrm>
+      </p:grpSpPr>
+      <p:sp>
+        <p:nvSpPr>
+          <p:cNvPr id="4" name="제목 3"/>
+          <p:cNvSpPr>
+            <a:spLocks noGrp="1"/>
+          </p:cNvSpPr>
+          <p:nvPr>
+            <p:ph type="title"/>
+          </p:nvPr>
+        </p:nvSpPr>
+        <p:spPr>
+          <a:xfrm>
+            <a:off x="250190" y="0"/>
+            <a:ext cx="3373755" cy="650875"/>
+          </a:xfrm>
+        </p:spPr>
+        <p:txBody>
+          <a:bodyPr anchor="ctr">
+            <a:normAutofit/>
+          </a:bodyPr>
+          <a:lstStyle/>
+          <a:p>
+            <a:pPr lvl="0">
+              <a:defRPr/>
+            </a:pPr>
+            <a:r>
+              <a:rPr lang="ko-KR" altLang="en-US" sz="2800" smtClean="0"/>
+              <a:t>클래스 다이어그램</a:t>
+            </a:r>
+            <a:endParaRPr lang="ko-KR" altLang="en-US" sz="2800"/>
+          </a:p>
+        </p:txBody>
+      </p:sp>
+      <p:sp>
+        <p:nvSpPr>
+          <p:cNvPr id="5" name="텍스트 개체 틀 4"/>
+          <p:cNvSpPr>
+            <a:spLocks noGrp="1"/>
+          </p:cNvSpPr>
+          <p:nvPr>
+            <p:ph type="body" sz="half" idx="2"/>
+          </p:nvPr>
+        </p:nvSpPr>
+        <p:spPr>
+          <a:xfrm>
+            <a:off x="3424555" y="0"/>
+            <a:ext cx="3931920" cy="650875"/>
+          </a:xfrm>
+        </p:spPr>
+        <p:txBody>
+          <a:bodyPr anchor="ctr">
+            <a:normAutofit/>
+          </a:bodyPr>
+          <a:lstStyle/>
+          <a:p>
+            <a:pPr lvl="0">
+              <a:defRPr/>
+            </a:pPr>
+            <a:r>
+              <a:rPr lang="en-US" altLang="ko-KR" smtClean="0"/>
+              <a:t>Admin</a:t>
+            </a:r>
+            <a:endParaRPr lang="ko-KR" altLang="en-US"/>
+          </a:p>
+        </p:txBody>
+      </p:sp>
+      <p:pic>
+        <p:nvPicPr>
+          <p:cNvPr id="2050" name="Picture 2" descr="C:\Users\DongKyun\Documents\GitHub\KHFinalProject\보고서\클래스\admin클래스.jpg"/>
+          <p:cNvPicPr>
+            <a:picLocks noChangeAspect="1" noChangeArrowheads="1"/>
+          </p:cNvPicPr>
+          <p:nvPr/>
+        </p:nvPicPr>
+        <p:blipFill>
+          <a:blip r:embed="rId2">
+            <a:extLst>
+              <a:ext uri="{28A0092B-C50C-407E-A947-70E740481C1C}">
+                <a14:useLocalDpi xmlns:a14="http://schemas.microsoft.com/office/drawing/2010/main" val="0"/>
+              </a:ext>
+            </a:extLst>
+          </a:blip>
+          <a:srcRect/>
+          <a:stretch>
+            <a:fillRect/>
+          </a:stretch>
+        </p:blipFill>
+        <p:spPr bwMode="auto">
+          <a:xfrm>
+            <a:off x="2057400" y="746124"/>
+            <a:ext cx="7620000" cy="5991225"/>
+          </a:xfrm>
+          <a:prstGeom prst="rect">
+            <a:avLst/>
+          </a:prstGeom>
+          <a:noFill/>
+          <a:extLst>
+            <a:ext uri="{909E8E84-426E-40DD-AFC4-6F175D3DCCD1}">
+              <a14:hiddenFill xmlns:a14="http://schemas.microsoft.com/office/drawing/2010/main">
+                <a:solidFill>
+                  <a:srgbClr val="FFFFFF"/>
+                </a:solidFill>
+              </a14:hiddenFill>
+            </a:ext>
+          </a:extLst>
+        </p:spPr>
+      </p:pic>
+    </p:spTree>
+    <p:extLst>
+      <p:ext uri="{BB962C8B-B14F-4D97-AF65-F5344CB8AC3E}">
+        <p14:creationId xmlns:p14="http://schemas.microsoft.com/office/powerpoint/2010/main" val="4112727436"/>
+      </p:ext>
+    </p:extLst>
+  </p:cSld>
+  <p:clrMapOvr>
+    <a:masterClrMapping/>
+  </p:clrMapOvr>
+  <p:transition/>
+  <p:timing>
+    <p:tnLst>
+      <p:par>
+        <p:cTn id="1" dur="indefinite" restart="never" nodeType="tmRoot"/>
+      </p:par>
+    </p:tnLst>
+  </p:timing>
+</p:sld>
+</file>
+
+<file path=ppt/slides/slide13.xml><?xml version="1.0" encoding="utf-8"?>
+<p:sld xmlns:a="http://schemas.openxmlformats.org/drawingml/2006/main" xmlns:r="http://schemas.openxmlformats.org/officeDocument/2006/relationships" xmlns:p="http://schemas.openxmlformats.org/presentationml/2006/main">
+  <p:cSld>
+    <p:spTree>
+      <p:nvGrpSpPr>
+        <p:cNvPr id="1" name=""/>
+        <p:cNvGrpSpPr/>
+        <p:nvPr/>
+      </p:nvGrpSpPr>
+      <p:grpSpPr>
+        <a:xfrm>
+          <a:off x="0" y="0"/>
+          <a:ext cx="0" cy="0"/>
+          <a:chOff x="0" y="0"/>
+          <a:chExt cx="0" cy="0"/>
+        </a:xfrm>
+      </p:grpSpPr>
+      <p:sp>
+        <p:nvSpPr>
+          <p:cNvPr id="4" name="제목 3"/>
+          <p:cNvSpPr>
+            <a:spLocks noGrp="1"/>
+          </p:cNvSpPr>
+          <p:nvPr>
+            <p:ph type="title"/>
+          </p:nvPr>
+        </p:nvSpPr>
+        <p:spPr>
+          <a:xfrm>
+            <a:off x="250190" y="0"/>
+            <a:ext cx="3373755" cy="650875"/>
+          </a:xfrm>
+        </p:spPr>
+        <p:txBody>
+          <a:bodyPr anchor="ctr">
+            <a:normAutofit/>
+          </a:bodyPr>
+          <a:lstStyle/>
+          <a:p>
+            <a:pPr lvl="0">
+              <a:defRPr/>
+            </a:pPr>
+            <a:r>
+              <a:rPr lang="ko-KR" altLang="en-US" sz="2800" smtClean="0"/>
+              <a:t>클래스 다이어그램</a:t>
+            </a:r>
+            <a:endParaRPr lang="ko-KR" altLang="en-US" sz="2800"/>
+          </a:p>
+        </p:txBody>
+      </p:sp>
+      <p:sp>
+        <p:nvSpPr>
+          <p:cNvPr id="5" name="텍스트 개체 틀 4"/>
+          <p:cNvSpPr>
+            <a:spLocks noGrp="1"/>
+          </p:cNvSpPr>
+          <p:nvPr>
+            <p:ph type="body" sz="half" idx="2"/>
+          </p:nvPr>
+        </p:nvSpPr>
+        <p:spPr>
+          <a:xfrm>
+            <a:off x="3424555" y="0"/>
+            <a:ext cx="3931920" cy="650875"/>
+          </a:xfrm>
+        </p:spPr>
+        <p:txBody>
+          <a:bodyPr anchor="ctr">
+            <a:normAutofit/>
+          </a:bodyPr>
+          <a:lstStyle/>
+          <a:p>
+            <a:pPr lvl="0">
+              <a:defRPr/>
+            </a:pPr>
+            <a:r>
+              <a:rPr lang="en-US" altLang="ko-KR" smtClean="0"/>
+              <a:t>Gym</a:t>
+            </a:r>
+            <a:endParaRPr lang="ko-KR" altLang="en-US"/>
+          </a:p>
+        </p:txBody>
+      </p:sp>
+      <p:pic>
+        <p:nvPicPr>
+          <p:cNvPr id="3074" name="Picture 2" descr="C:\Users\DongKyun\Documents\GitHub\KHFinalProject\보고서\클래스\gym클래스.jpg"/>
+          <p:cNvPicPr>
+            <a:picLocks noChangeAspect="1" noChangeArrowheads="1"/>
+          </p:cNvPicPr>
+          <p:nvPr/>
+        </p:nvPicPr>
+        <p:blipFill>
+          <a:blip r:embed="rId2">
+            <a:extLst>
+              <a:ext uri="{28A0092B-C50C-407E-A947-70E740481C1C}">
+                <a14:useLocalDpi xmlns:a14="http://schemas.microsoft.com/office/drawing/2010/main" val="0"/>
+              </a:ext>
+            </a:extLst>
+          </a:blip>
+          <a:srcRect/>
+          <a:stretch>
+            <a:fillRect/>
+          </a:stretch>
+        </p:blipFill>
+        <p:spPr bwMode="auto">
+          <a:xfrm>
+            <a:off x="698500" y="1044575"/>
+            <a:ext cx="10909300" cy="5283200"/>
+          </a:xfrm>
+          <a:prstGeom prst="rect">
+            <a:avLst/>
+          </a:prstGeom>
+          <a:noFill/>
+          <a:extLst>
+            <a:ext uri="{909E8E84-426E-40DD-AFC4-6F175D3DCCD1}">
+              <a14:hiddenFill xmlns:a14="http://schemas.microsoft.com/office/drawing/2010/main">
+                <a:solidFill>
+                  <a:srgbClr val="FFFFFF"/>
+                </a:solidFill>
+              </a14:hiddenFill>
+            </a:ext>
+          </a:extLst>
+        </p:spPr>
+      </p:pic>
+    </p:spTree>
+    <p:extLst>
+      <p:ext uri="{BB962C8B-B14F-4D97-AF65-F5344CB8AC3E}">
+        <p14:creationId xmlns:p14="http://schemas.microsoft.com/office/powerpoint/2010/main" val="2869662868"/>
+      </p:ext>
+    </p:extLst>
+  </p:cSld>
+  <p:clrMapOvr>
+    <a:masterClrMapping/>
+  </p:clrMapOvr>
+  <p:transition/>
+  <p:timing>
+    <p:tnLst>
+      <p:par>
+        <p:cTn id="1" dur="indefinite" restart="never" nodeType="tmRoot"/>
+      </p:par>
+    </p:tnLst>
+  </p:timing>
+</p:sld>
+</file>
+
+<file path=ppt/slides/slide14.xml><?xml version="1.0" encoding="utf-8"?>
+<p:sld xmlns:a="http://schemas.openxmlformats.org/drawingml/2006/main" xmlns:r="http://schemas.openxmlformats.org/officeDocument/2006/relationships" xmlns:p="http://schemas.openxmlformats.org/presentationml/2006/main">
+  <p:cSld>
+    <p:spTree>
+      <p:nvGrpSpPr>
+        <p:cNvPr id="1" name=""/>
+        <p:cNvGrpSpPr/>
+        <p:nvPr/>
+      </p:nvGrpSpPr>
+      <p:grpSpPr>
+        <a:xfrm>
+          <a:off x="0" y="0"/>
+          <a:ext cx="0" cy="0"/>
+          <a:chOff x="0" y="0"/>
+          <a:chExt cx="0" cy="0"/>
+        </a:xfrm>
+      </p:grpSpPr>
+      <p:sp>
+        <p:nvSpPr>
+          <p:cNvPr id="4" name="제목 3"/>
+          <p:cNvSpPr>
+            <a:spLocks noGrp="1"/>
+          </p:cNvSpPr>
+          <p:nvPr>
+            <p:ph type="title"/>
+          </p:nvPr>
+        </p:nvSpPr>
+        <p:spPr>
+          <a:xfrm>
+            <a:off x="250190" y="0"/>
+            <a:ext cx="3373755" cy="650875"/>
+          </a:xfrm>
+        </p:spPr>
+        <p:txBody>
+          <a:bodyPr anchor="ctr">
+            <a:normAutofit/>
+          </a:bodyPr>
+          <a:lstStyle/>
+          <a:p>
+            <a:pPr lvl="0">
+              <a:defRPr/>
+            </a:pPr>
+            <a:r>
+              <a:rPr lang="ko-KR" altLang="en-US" sz="2800" smtClean="0"/>
+              <a:t>클래스 다이어그램</a:t>
+            </a:r>
+            <a:endParaRPr lang="ko-KR" altLang="en-US" sz="2800"/>
+          </a:p>
+        </p:txBody>
+      </p:sp>
+      <p:sp>
+        <p:nvSpPr>
+          <p:cNvPr id="5" name="텍스트 개체 틀 4"/>
+          <p:cNvSpPr>
+            <a:spLocks noGrp="1"/>
+          </p:cNvSpPr>
+          <p:nvPr>
+            <p:ph type="body" sz="half" idx="2"/>
+          </p:nvPr>
+        </p:nvSpPr>
+        <p:spPr>
+          <a:xfrm>
+            <a:off x="3424555" y="0"/>
+            <a:ext cx="3931920" cy="650875"/>
+          </a:xfrm>
+        </p:spPr>
+        <p:txBody>
+          <a:bodyPr anchor="ctr">
+            <a:normAutofit/>
+          </a:bodyPr>
+          <a:lstStyle/>
+          <a:p>
+            <a:pPr lvl="0">
+              <a:defRPr/>
+            </a:pPr>
+            <a:r>
+              <a:rPr lang="en-US" altLang="ko-KR" smtClean="0"/>
+              <a:t>Health</a:t>
+            </a:r>
+            <a:endParaRPr lang="ko-KR" altLang="en-US"/>
+          </a:p>
+        </p:txBody>
+      </p:sp>
+      <p:pic>
+        <p:nvPicPr>
+          <p:cNvPr id="4098" name="Picture 2" descr="C:\Users\DongKyun\Documents\GitHub\KHFinalProject\보고서\클래스\health클래스.jpg"/>
+          <p:cNvPicPr>
+            <a:picLocks noChangeAspect="1" noChangeArrowheads="1"/>
+          </p:cNvPicPr>
+          <p:nvPr/>
+        </p:nvPicPr>
+        <p:blipFill>
+          <a:blip r:embed="rId2">
+            <a:extLst>
+              <a:ext uri="{28A0092B-C50C-407E-A947-70E740481C1C}">
+                <a14:useLocalDpi xmlns:a14="http://schemas.microsoft.com/office/drawing/2010/main" val="0"/>
+              </a:ext>
+            </a:extLst>
+          </a:blip>
+          <a:srcRect/>
+          <a:stretch>
+            <a:fillRect/>
+          </a:stretch>
+        </p:blipFill>
+        <p:spPr bwMode="auto">
+          <a:xfrm>
+            <a:off x="1908175" y="1949450"/>
+            <a:ext cx="8166100" cy="3225800"/>
+          </a:xfrm>
+          <a:prstGeom prst="rect">
+            <a:avLst/>
+          </a:prstGeom>
+          <a:noFill/>
+          <a:extLst>
+            <a:ext uri="{909E8E84-426E-40DD-AFC4-6F175D3DCCD1}">
+              <a14:hiddenFill xmlns:a14="http://schemas.microsoft.com/office/drawing/2010/main">
+                <a:solidFill>
+                  <a:srgbClr val="FFFFFF"/>
+                </a:solidFill>
+              </a14:hiddenFill>
+            </a:ext>
+          </a:extLst>
+        </p:spPr>
+      </p:pic>
+    </p:spTree>
+    <p:extLst>
+      <p:ext uri="{BB962C8B-B14F-4D97-AF65-F5344CB8AC3E}">
+        <p14:creationId xmlns:p14="http://schemas.microsoft.com/office/powerpoint/2010/main" val="28708698"/>
+      </p:ext>
+    </p:extLst>
+  </p:cSld>
+  <p:clrMapOvr>
+    <a:masterClrMapping/>
+  </p:clrMapOvr>
+  <p:transition/>
+  <p:timing>
+    <p:tnLst>
+      <p:par>
+        <p:cTn id="1" dur="indefinite" restart="never" nodeType="tmRoot"/>
+      </p:par>
+    </p:tnLst>
+  </p:timing>
+</p:sld>
+</file>
+
+<file path=ppt/slides/slide15.xml><?xml version="1.0" encoding="utf-8"?>
+<p:sld xmlns:a="http://schemas.openxmlformats.org/drawingml/2006/main" xmlns:r="http://schemas.openxmlformats.org/officeDocument/2006/relationships" xmlns:p="http://schemas.openxmlformats.org/presentationml/2006/main">
+  <p:cSld>
     <p:spTree>
       <p:nvGrpSpPr>
         <p:cNvPr id="1" name=""/>
@@ -3187,7 +3942,7 @@
 </p:sld>
 </file>
 
-<file path=ppt/slides/slide11.xml><?xml version="1.0" encoding="utf-8"?>
+<file path=ppt/slides/slide16.xml><?xml version="1.0" encoding="utf-8"?>
 <p:sld xmlns:a="http://schemas.openxmlformats.org/drawingml/2006/main" xmlns:r="http://schemas.openxmlformats.org/officeDocument/2006/relationships" xmlns:p="http://schemas.openxmlformats.org/presentationml/2006/main">
   <p:cSld>
     <p:spTree>
@@ -3270,47 +4025,6 @@
           </a:p>
         </p:txBody>
       </p:sp>
-      <p:pic>
-        <p:nvPicPr>
-          <p:cNvPr id="1026" name="Picture 2" descr="C:\Users\DongKyun\Documents\GitHub\KHFinalProject\보고서\클래스\community클래스.jpg"/>
-          <p:cNvPicPr>
-            <a:picLocks noChangeAspect="1" noChangeArrowheads="1"/>
-          </p:cNvPicPr>
-          <p:nvPr/>
-        </p:nvPicPr>
-        <p:blipFill>
-          <a:blip r:embed="rId2">
-            <a:extLst>
-              <a:ext uri="{28A0092B-C50C-407E-A947-70E740481C1C}">
-                <a14:useLocalDpi xmlns:a14="http://schemas.microsoft.com/office/drawing/2010/main" val="0"/>
-              </a:ext>
-            </a:extLst>
-          </a:blip>
-          <a:srcRect/>
-          <a:stretch>
-            <a:fillRect/>
-          </a:stretch>
-        </p:blipFill>
-        <p:spPr bwMode="auto">
-          <a:xfrm>
-            <a:off x="222249" y="809625"/>
-            <a:ext cx="11598276" cy="5679292"/>
-          </a:xfrm>
-          <a:prstGeom prst="rect">
-            <a:avLst/>
-          </a:prstGeom>
-          <a:noFill/>
-          <a:extLst>
-            <a:ext uri="{909E8E84-426E-40DD-AFC4-6F175D3DCCD1}">
-              <a14:hiddenFill xmlns:a14="http://schemas.microsoft.com/office/drawing/2010/main">
-                <a:solidFill>
-                  <a:srgbClr val="FFFFFF"/>
-                </a:solidFill>
-              </a14:hiddenFill>
-            </a:ext>
-          </a:extLst>
-        </p:spPr>
-      </p:pic>
     </p:spTree>
     <p:extLst>
       <p:ext uri="{BB962C8B-B14F-4D97-AF65-F5344CB8AC3E}">
@@ -3332,7 +4046,7 @@
 </p:sld>
 </file>
 
-<file path=ppt/slides/slide12.xml><?xml version="1.0" encoding="utf-8"?>
+<file path=ppt/slides/slide17.xml><?xml version="1.0" encoding="utf-8"?>
 <p:sld xmlns:a="http://schemas.openxmlformats.org/drawingml/2006/main" xmlns:r="http://schemas.openxmlformats.org/officeDocument/2006/relationships" xmlns:p="http://schemas.openxmlformats.org/presentationml/2006/main">
   <p:cSld>
     <p:bg>
@@ -3362,7 +4076,7 @@
           <p:cNvPr id="2" name="그룹 1">
             <a:extLst>
               <a:ext uri="{FF2B5EF4-FFF2-40B4-BE49-F238E27FC236}">
-                <a16:creationId xmlns="" xmlns:a16="http://schemas.microsoft.com/office/drawing/2014/main" xmlns:p14="http://schemas.microsoft.com/office/powerpoint/2010/main" id="{C71E5FE6-3E6D-4092-81AA-962DB5284ABF}"/>
+                <a16:creationId xmlns:p14="http://schemas.microsoft.com/office/powerpoint/2010/main" xmlns:a16="http://schemas.microsoft.com/office/drawing/2014/main" xmlns="" id="{C71E5FE6-3E6D-4092-81AA-962DB5284ABF}"/>
               </a:ext>
             </a:extLst>
           </p:cNvPr>
@@ -3444,7 +4158,7 @@
             <p:cNvPr id="6" name="TextBox 5">
               <a:extLst>
                 <a:ext uri="{FF2B5EF4-FFF2-40B4-BE49-F238E27FC236}">
-                  <a16:creationId xmlns="" xmlns:a16="http://schemas.microsoft.com/office/drawing/2014/main" xmlns:p14="http://schemas.microsoft.com/office/powerpoint/2010/main" id="{BCB0E9E3-FAB5-4E31-83EE-08A0FE55BB4A}"/>
+                  <a16:creationId xmlns:p14="http://schemas.microsoft.com/office/powerpoint/2010/main" xmlns:a16="http://schemas.microsoft.com/office/drawing/2014/main" xmlns="" id="{BCB0E9E3-FAB5-4E31-83EE-08A0FE55BB4A}"/>
                 </a:ext>
               </a:extLst>
             </p:cNvPr>
@@ -3536,690 +4250,6 @@
 </p:sld>
 </file>
 
-<file path=ppt/slides/slide13.xml><?xml version="1.0" encoding="utf-8"?>
-<p:sld xmlns:a="http://schemas.openxmlformats.org/drawingml/2006/main" xmlns:r="http://schemas.openxmlformats.org/officeDocument/2006/relationships" xmlns:p="http://schemas.openxmlformats.org/presentationml/2006/main">
-  <p:cSld>
-    <p:spTree>
-      <p:nvGrpSpPr>
-        <p:cNvPr id="1" name=""/>
-        <p:cNvGrpSpPr/>
-        <p:nvPr/>
-      </p:nvGrpSpPr>
-      <p:grpSpPr>
-        <a:xfrm>
-          <a:off x="0" y="0"/>
-          <a:ext cx="0" cy="0"/>
-          <a:chOff x="0" y="0"/>
-          <a:chExt cx="0" cy="0"/>
-        </a:xfrm>
-      </p:grpSpPr>
-      <p:sp>
-        <p:nvSpPr>
-          <p:cNvPr id="4" name="제목 3"/>
-          <p:cNvSpPr>
-            <a:spLocks noGrp="1"/>
-          </p:cNvSpPr>
-          <p:nvPr>
-            <p:ph type="title"/>
-          </p:nvPr>
-        </p:nvSpPr>
-        <p:spPr>
-          <a:xfrm>
-            <a:off x="250190" y="0"/>
-            <a:ext cx="3373755" cy="650875"/>
-          </a:xfrm>
-        </p:spPr>
-        <p:txBody>
-          <a:bodyPr anchor="ctr">
-            <a:normAutofit/>
-          </a:bodyPr>
-          <a:lstStyle/>
-          <a:p>
-            <a:pPr lvl="0">
-              <a:defRPr/>
-            </a:pPr>
-            <a:r>
-              <a:rPr lang="ko-KR" altLang="en-US" sz="2800" smtClean="0"/>
-              <a:t>시퀀스 다이어그램</a:t>
-            </a:r>
-            <a:endParaRPr lang="ko-KR" altLang="en-US" sz="2800"/>
-          </a:p>
-        </p:txBody>
-      </p:sp>
-      <p:sp>
-        <p:nvSpPr>
-          <p:cNvPr id="6" name="텍스트 개체 틀 4"/>
-          <p:cNvSpPr>
-            <a:spLocks noGrp="1"/>
-          </p:cNvSpPr>
-          <p:nvPr>
-            <p:ph type="body" sz="half" idx="2"/>
-          </p:nvPr>
-        </p:nvSpPr>
-        <p:spPr>
-          <a:xfrm>
-            <a:off x="3424555" y="0"/>
-            <a:ext cx="3931920" cy="650875"/>
-          </a:xfrm>
-        </p:spPr>
-        <p:txBody>
-          <a:bodyPr anchor="ctr">
-            <a:normAutofit/>
-          </a:bodyPr>
-          <a:lstStyle/>
-          <a:p>
-            <a:pPr lvl="0">
-              <a:defRPr/>
-            </a:pPr>
-            <a:r>
-              <a:rPr lang="en-US" altLang="ko-KR" smtClean="0"/>
-              <a:t>User</a:t>
-            </a:r>
-            <a:endParaRPr lang="ko-KR" altLang="en-US"/>
-          </a:p>
-        </p:txBody>
-      </p:sp>
-    </p:spTree>
-    <p:extLst>
-      <p:ext uri="{BB962C8B-B14F-4D97-AF65-F5344CB8AC3E}">
-        <p14:creationId xmlns:p14="http://schemas.microsoft.com/office/powerpoint/2010/main" val="3649887602"/>
-      </p:ext>
-    </p:extLst>
-  </p:cSld>
-  <p:clrMapOvr>
-    <a:masterClrMapping/>
-  </p:clrMapOvr>
-  <p:transition/>
-  <p:timing>
-    <p:tnLst>
-      <p:par>
-        <p:cTn id="1" dur="indefinite" restart="never" nodeType="tmRoot"/>
-      </p:par>
-    </p:tnLst>
-  </p:timing>
-</p:sld>
-</file>
-
-<file path=ppt/slides/slide14.xml><?xml version="1.0" encoding="utf-8"?>
-<p:sld xmlns:a="http://schemas.openxmlformats.org/drawingml/2006/main" xmlns:r="http://schemas.openxmlformats.org/officeDocument/2006/relationships" xmlns:p="http://schemas.openxmlformats.org/presentationml/2006/main">
-  <p:cSld>
-    <p:spTree>
-      <p:nvGrpSpPr>
-        <p:cNvPr id="1" name=""/>
-        <p:cNvGrpSpPr/>
-        <p:nvPr/>
-      </p:nvGrpSpPr>
-      <p:grpSpPr>
-        <a:xfrm>
-          <a:off x="0" y="0"/>
-          <a:ext cx="0" cy="0"/>
-          <a:chOff x="0" y="0"/>
-          <a:chExt cx="0" cy="0"/>
-        </a:xfrm>
-      </p:grpSpPr>
-      <p:sp>
-        <p:nvSpPr>
-          <p:cNvPr id="4" name="제목 3"/>
-          <p:cNvSpPr>
-            <a:spLocks noGrp="1"/>
-          </p:cNvSpPr>
-          <p:nvPr>
-            <p:ph type="title"/>
-          </p:nvPr>
-        </p:nvSpPr>
-        <p:spPr>
-          <a:xfrm>
-            <a:off x="250190" y="0"/>
-            <a:ext cx="3373755" cy="650875"/>
-          </a:xfrm>
-        </p:spPr>
-        <p:txBody>
-          <a:bodyPr anchor="ctr">
-            <a:normAutofit/>
-          </a:bodyPr>
-          <a:lstStyle/>
-          <a:p>
-            <a:pPr lvl="0">
-              <a:defRPr/>
-            </a:pPr>
-            <a:r>
-              <a:rPr lang="ko-KR" altLang="en-US" sz="2800" smtClean="0"/>
-              <a:t>시퀀스 다이어그램</a:t>
-            </a:r>
-            <a:endParaRPr lang="ko-KR" altLang="en-US" sz="2800"/>
-          </a:p>
-        </p:txBody>
-      </p:sp>
-      <p:sp>
-        <p:nvSpPr>
-          <p:cNvPr id="6" name="텍스트 개체 틀 4"/>
-          <p:cNvSpPr>
-            <a:spLocks noGrp="1"/>
-          </p:cNvSpPr>
-          <p:nvPr>
-            <p:ph type="body" sz="half" idx="2"/>
-          </p:nvPr>
-        </p:nvSpPr>
-        <p:spPr>
-          <a:xfrm>
-            <a:off x="3424555" y="0"/>
-            <a:ext cx="3931920" cy="650875"/>
-          </a:xfrm>
-        </p:spPr>
-        <p:txBody>
-          <a:bodyPr anchor="ctr">
-            <a:normAutofit/>
-          </a:bodyPr>
-          <a:lstStyle/>
-          <a:p>
-            <a:pPr lvl="0">
-              <a:defRPr/>
-            </a:pPr>
-            <a:r>
-              <a:rPr lang="en-US" altLang="ko-KR" smtClean="0"/>
-              <a:t>User – MyPage Main View</a:t>
-            </a:r>
-            <a:endParaRPr lang="ko-KR" altLang="en-US"/>
-          </a:p>
-        </p:txBody>
-      </p:sp>
-      <p:pic>
-        <p:nvPicPr>
-          <p:cNvPr id="7170" name="Picture 2" descr="C:\Users\DongKyun\Documents\GitHub\KHFinalProject\보고서\클래스\시퀀스_지선\MyPage Main View.png"/>
-          <p:cNvPicPr>
-            <a:picLocks noChangeAspect="1" noChangeArrowheads="1"/>
-          </p:cNvPicPr>
-          <p:nvPr/>
-        </p:nvPicPr>
-        <p:blipFill>
-          <a:blip r:embed="rId2">
-            <a:extLst>
-              <a:ext uri="{28A0092B-C50C-407E-A947-70E740481C1C}">
-                <a14:useLocalDpi xmlns:a14="http://schemas.microsoft.com/office/drawing/2010/main" val="0"/>
-              </a:ext>
-            </a:extLst>
-          </a:blip>
-          <a:srcRect/>
-          <a:stretch>
-            <a:fillRect/>
-          </a:stretch>
-        </p:blipFill>
-        <p:spPr bwMode="auto">
-          <a:xfrm>
-            <a:off x="0" y="641350"/>
-            <a:ext cx="12194988" cy="6216650"/>
-          </a:xfrm>
-          <a:prstGeom prst="rect">
-            <a:avLst/>
-          </a:prstGeom>
-          <a:noFill/>
-          <a:extLst>
-            <a:ext uri="{909E8E84-426E-40DD-AFC4-6F175D3DCCD1}">
-              <a14:hiddenFill xmlns:a14="http://schemas.microsoft.com/office/drawing/2010/main">
-                <a:solidFill>
-                  <a:srgbClr val="FFFFFF"/>
-                </a:solidFill>
-              </a14:hiddenFill>
-            </a:ext>
-          </a:extLst>
-        </p:spPr>
-      </p:pic>
-    </p:spTree>
-    <p:extLst>
-      <p:ext uri="{BB962C8B-B14F-4D97-AF65-F5344CB8AC3E}">
-        <p14:creationId xmlns:p14="http://schemas.microsoft.com/office/powerpoint/2010/main" val="2436643994"/>
-      </p:ext>
-    </p:extLst>
-  </p:cSld>
-  <p:clrMapOvr>
-    <a:masterClrMapping/>
-  </p:clrMapOvr>
-  <p:transition/>
-  <p:timing>
-    <p:tnLst>
-      <p:par>
-        <p:cTn id="1" dur="indefinite" restart="never" nodeType="tmRoot"/>
-      </p:par>
-    </p:tnLst>
-  </p:timing>
-</p:sld>
-</file>
-
-<file path=ppt/slides/slide15.xml><?xml version="1.0" encoding="utf-8"?>
-<p:sld xmlns:a="http://schemas.openxmlformats.org/drawingml/2006/main" xmlns:r="http://schemas.openxmlformats.org/officeDocument/2006/relationships" xmlns:p="http://schemas.openxmlformats.org/presentationml/2006/main">
-  <p:cSld>
-    <p:spTree>
-      <p:nvGrpSpPr>
-        <p:cNvPr id="1" name=""/>
-        <p:cNvGrpSpPr/>
-        <p:nvPr/>
-      </p:nvGrpSpPr>
-      <p:grpSpPr>
-        <a:xfrm>
-          <a:off x="0" y="0"/>
-          <a:ext cx="0" cy="0"/>
-          <a:chOff x="0" y="0"/>
-          <a:chExt cx="0" cy="0"/>
-        </a:xfrm>
-      </p:grpSpPr>
-      <p:sp>
-        <p:nvSpPr>
-          <p:cNvPr id="4" name="제목 3"/>
-          <p:cNvSpPr>
-            <a:spLocks noGrp="1"/>
-          </p:cNvSpPr>
-          <p:nvPr>
-            <p:ph type="title"/>
-          </p:nvPr>
-        </p:nvSpPr>
-        <p:spPr>
-          <a:xfrm>
-            <a:off x="250190" y="0"/>
-            <a:ext cx="3373755" cy="650875"/>
-          </a:xfrm>
-        </p:spPr>
-        <p:txBody>
-          <a:bodyPr anchor="ctr">
-            <a:normAutofit/>
-          </a:bodyPr>
-          <a:lstStyle/>
-          <a:p>
-            <a:pPr lvl="0">
-              <a:defRPr/>
-            </a:pPr>
-            <a:r>
-              <a:rPr lang="ko-KR" altLang="en-US" sz="2800" smtClean="0"/>
-              <a:t>시퀀스 다이어그램</a:t>
-            </a:r>
-            <a:endParaRPr lang="ko-KR" altLang="en-US" sz="2800"/>
-          </a:p>
-        </p:txBody>
-      </p:sp>
-      <p:sp>
-        <p:nvSpPr>
-          <p:cNvPr id="6" name="텍스트 개체 틀 4"/>
-          <p:cNvSpPr>
-            <a:spLocks noGrp="1"/>
-          </p:cNvSpPr>
-          <p:nvPr>
-            <p:ph type="body" sz="half" idx="2"/>
-          </p:nvPr>
-        </p:nvSpPr>
-        <p:spPr>
-          <a:xfrm>
-            <a:off x="3424555" y="0"/>
-            <a:ext cx="3931920" cy="650875"/>
-          </a:xfrm>
-        </p:spPr>
-        <p:txBody>
-          <a:bodyPr anchor="ctr">
-            <a:normAutofit/>
-          </a:bodyPr>
-          <a:lstStyle/>
-          <a:p>
-            <a:pPr lvl="0">
-              <a:defRPr/>
-            </a:pPr>
-            <a:r>
-              <a:rPr lang="en-US" altLang="ko-KR" smtClean="0"/>
-              <a:t>User – MyPage Board List</a:t>
-            </a:r>
-            <a:endParaRPr lang="ko-KR" altLang="en-US"/>
-          </a:p>
-        </p:txBody>
-      </p:sp>
-      <p:pic>
-        <p:nvPicPr>
-          <p:cNvPr id="8194" name="Picture 2" descr="C:\Users\DongKyun\Documents\GitHub\KHFinalProject\보고서\클래스\시퀀스_지선\MyPage Board List.png"/>
-          <p:cNvPicPr>
-            <a:picLocks noChangeAspect="1" noChangeArrowheads="1"/>
-          </p:cNvPicPr>
-          <p:nvPr/>
-        </p:nvPicPr>
-        <p:blipFill>
-          <a:blip r:embed="rId2">
-            <a:extLst>
-              <a:ext uri="{28A0092B-C50C-407E-A947-70E740481C1C}">
-                <a14:useLocalDpi xmlns:a14="http://schemas.microsoft.com/office/drawing/2010/main" val="0"/>
-              </a:ext>
-            </a:extLst>
-          </a:blip>
-          <a:srcRect/>
-          <a:stretch>
-            <a:fillRect/>
-          </a:stretch>
-        </p:blipFill>
-        <p:spPr bwMode="auto">
-          <a:xfrm>
-            <a:off x="0" y="650874"/>
-            <a:ext cx="12192000" cy="6207125"/>
-          </a:xfrm>
-          <a:prstGeom prst="rect">
-            <a:avLst/>
-          </a:prstGeom>
-          <a:noFill/>
-          <a:extLst>
-            <a:ext uri="{909E8E84-426E-40DD-AFC4-6F175D3DCCD1}">
-              <a14:hiddenFill xmlns:a14="http://schemas.microsoft.com/office/drawing/2010/main">
-                <a:solidFill>
-                  <a:srgbClr val="FFFFFF"/>
-                </a:solidFill>
-              </a14:hiddenFill>
-            </a:ext>
-          </a:extLst>
-        </p:spPr>
-      </p:pic>
-    </p:spTree>
-    <p:extLst>
-      <p:ext uri="{BB962C8B-B14F-4D97-AF65-F5344CB8AC3E}">
-        <p14:creationId xmlns:p14="http://schemas.microsoft.com/office/powerpoint/2010/main" val="2649322468"/>
-      </p:ext>
-    </p:extLst>
-  </p:cSld>
-  <p:clrMapOvr>
-    <a:masterClrMapping/>
-  </p:clrMapOvr>
-  <p:transition/>
-  <p:timing>
-    <p:tnLst>
-      <p:par>
-        <p:cTn id="1" dur="indefinite" restart="never" nodeType="tmRoot"/>
-      </p:par>
-    </p:tnLst>
-  </p:timing>
-</p:sld>
-</file>
-
-<file path=ppt/slides/slide16.xml><?xml version="1.0" encoding="utf-8"?>
-<p:sld xmlns:a="http://schemas.openxmlformats.org/drawingml/2006/main" xmlns:r="http://schemas.openxmlformats.org/officeDocument/2006/relationships" xmlns:p="http://schemas.openxmlformats.org/presentationml/2006/main">
-  <p:cSld>
-    <p:spTree>
-      <p:nvGrpSpPr>
-        <p:cNvPr id="1" name=""/>
-        <p:cNvGrpSpPr/>
-        <p:nvPr/>
-      </p:nvGrpSpPr>
-      <p:grpSpPr>
-        <a:xfrm>
-          <a:off x="0" y="0"/>
-          <a:ext cx="0" cy="0"/>
-          <a:chOff x="0" y="0"/>
-          <a:chExt cx="0" cy="0"/>
-        </a:xfrm>
-      </p:grpSpPr>
-      <p:sp>
-        <p:nvSpPr>
-          <p:cNvPr id="4" name="제목 3"/>
-          <p:cNvSpPr>
-            <a:spLocks noGrp="1"/>
-          </p:cNvSpPr>
-          <p:nvPr>
-            <p:ph type="title"/>
-          </p:nvPr>
-        </p:nvSpPr>
-        <p:spPr>
-          <a:xfrm>
-            <a:off x="250190" y="0"/>
-            <a:ext cx="3373755" cy="650875"/>
-          </a:xfrm>
-        </p:spPr>
-        <p:txBody>
-          <a:bodyPr anchor="ctr">
-            <a:normAutofit/>
-          </a:bodyPr>
-          <a:lstStyle/>
-          <a:p>
-            <a:pPr lvl="0">
-              <a:defRPr/>
-            </a:pPr>
-            <a:r>
-              <a:rPr lang="ko-KR" altLang="en-US" sz="2800" smtClean="0"/>
-              <a:t>시퀀스 다이어그램</a:t>
-            </a:r>
-            <a:endParaRPr lang="ko-KR" altLang="en-US" sz="2800"/>
-          </a:p>
-        </p:txBody>
-      </p:sp>
-      <p:sp>
-        <p:nvSpPr>
-          <p:cNvPr id="6" name="텍스트 개체 틀 4"/>
-          <p:cNvSpPr>
-            <a:spLocks noGrp="1"/>
-          </p:cNvSpPr>
-          <p:nvPr>
-            <p:ph type="body" sz="half" idx="2"/>
-          </p:nvPr>
-        </p:nvSpPr>
-        <p:spPr>
-          <a:xfrm>
-            <a:off x="3424555" y="0"/>
-            <a:ext cx="3931920" cy="650875"/>
-          </a:xfrm>
-        </p:spPr>
-        <p:txBody>
-          <a:bodyPr anchor="ctr">
-            <a:normAutofit/>
-          </a:bodyPr>
-          <a:lstStyle/>
-          <a:p>
-            <a:pPr lvl="0">
-              <a:defRPr/>
-            </a:pPr>
-            <a:r>
-              <a:rPr lang="en-US" altLang="ko-KR" smtClean="0"/>
-              <a:t>User – QnA Insert</a:t>
-            </a:r>
-            <a:endParaRPr lang="ko-KR" altLang="en-US"/>
-          </a:p>
-        </p:txBody>
-      </p:sp>
-      <p:pic>
-        <p:nvPicPr>
-          <p:cNvPr id="9218" name="Picture 2" descr="C:\Users\DongKyun\Documents\GitHub\KHFinalProject\보고서\클래스\시퀀스_지선\QnA Insert.png"/>
-          <p:cNvPicPr>
-            <a:picLocks noChangeAspect="1" noChangeArrowheads="1"/>
-          </p:cNvPicPr>
-          <p:nvPr/>
-        </p:nvPicPr>
-        <p:blipFill>
-          <a:blip r:embed="rId2">
-            <a:extLst>
-              <a:ext uri="{28A0092B-C50C-407E-A947-70E740481C1C}">
-                <a14:useLocalDpi xmlns:a14="http://schemas.microsoft.com/office/drawing/2010/main" val="0"/>
-              </a:ext>
-            </a:extLst>
-          </a:blip>
-          <a:srcRect/>
-          <a:stretch>
-            <a:fillRect/>
-          </a:stretch>
-        </p:blipFill>
-        <p:spPr bwMode="auto">
-          <a:xfrm>
-            <a:off x="28892" y="650874"/>
-            <a:ext cx="12163108" cy="6207126"/>
-          </a:xfrm>
-          <a:prstGeom prst="rect">
-            <a:avLst/>
-          </a:prstGeom>
-          <a:noFill/>
-          <a:extLst>
-            <a:ext uri="{909E8E84-426E-40DD-AFC4-6F175D3DCCD1}">
-              <a14:hiddenFill xmlns:a14="http://schemas.microsoft.com/office/drawing/2010/main">
-                <a:solidFill>
-                  <a:srgbClr val="FFFFFF"/>
-                </a:solidFill>
-              </a14:hiddenFill>
-            </a:ext>
-          </a:extLst>
-        </p:spPr>
-      </p:pic>
-    </p:spTree>
-    <p:extLst>
-      <p:ext uri="{BB962C8B-B14F-4D97-AF65-F5344CB8AC3E}">
-        <p14:creationId xmlns:p14="http://schemas.microsoft.com/office/powerpoint/2010/main" val="993955059"/>
-      </p:ext>
-    </p:extLst>
-  </p:cSld>
-  <p:clrMapOvr>
-    <a:masterClrMapping/>
-  </p:clrMapOvr>
-  <p:transition/>
-  <p:timing>
-    <p:tnLst>
-      <p:par>
-        <p:cTn id="1" dur="indefinite" restart="never" nodeType="tmRoot"/>
-      </p:par>
-    </p:tnLst>
-  </p:timing>
-</p:sld>
-</file>
-
-<file path=ppt/slides/slide17.xml><?xml version="1.0" encoding="utf-8"?>
-<p:sld xmlns:a="http://schemas.openxmlformats.org/drawingml/2006/main" xmlns:r="http://schemas.openxmlformats.org/officeDocument/2006/relationships" xmlns:p="http://schemas.openxmlformats.org/presentationml/2006/main">
-  <p:cSld>
-    <p:spTree>
-      <p:nvGrpSpPr>
-        <p:cNvPr id="1" name=""/>
-        <p:cNvGrpSpPr/>
-        <p:nvPr/>
-      </p:nvGrpSpPr>
-      <p:grpSpPr>
-        <a:xfrm>
-          <a:off x="0" y="0"/>
-          <a:ext cx="0" cy="0"/>
-          <a:chOff x="0" y="0"/>
-          <a:chExt cx="0" cy="0"/>
-        </a:xfrm>
-      </p:grpSpPr>
-      <p:sp>
-        <p:nvSpPr>
-          <p:cNvPr id="4" name="제목 3"/>
-          <p:cNvSpPr>
-            <a:spLocks noGrp="1"/>
-          </p:cNvSpPr>
-          <p:nvPr>
-            <p:ph type="title"/>
-          </p:nvPr>
-        </p:nvSpPr>
-        <p:spPr>
-          <a:xfrm>
-            <a:off x="250190" y="0"/>
-            <a:ext cx="3373755" cy="650875"/>
-          </a:xfrm>
-        </p:spPr>
-        <p:txBody>
-          <a:bodyPr anchor="ctr">
-            <a:normAutofit/>
-          </a:bodyPr>
-          <a:lstStyle/>
-          <a:p>
-            <a:pPr lvl="0">
-              <a:defRPr/>
-            </a:pPr>
-            <a:r>
-              <a:rPr lang="ko-KR" altLang="en-US" sz="2800" smtClean="0"/>
-              <a:t>시퀀스 다이어그램</a:t>
-            </a:r>
-            <a:endParaRPr lang="ko-KR" altLang="en-US" sz="2800"/>
-          </a:p>
-        </p:txBody>
-      </p:sp>
-      <p:sp>
-        <p:nvSpPr>
-          <p:cNvPr id="6" name="텍스트 개체 틀 4"/>
-          <p:cNvSpPr>
-            <a:spLocks noGrp="1"/>
-          </p:cNvSpPr>
-          <p:nvPr>
-            <p:ph type="body" sz="half" idx="2"/>
-          </p:nvPr>
-        </p:nvSpPr>
-        <p:spPr>
-          <a:xfrm>
-            <a:off x="3424555" y="0"/>
-            <a:ext cx="3931920" cy="650875"/>
-          </a:xfrm>
-        </p:spPr>
-        <p:txBody>
-          <a:bodyPr anchor="ctr">
-            <a:normAutofit/>
-          </a:bodyPr>
-          <a:lstStyle/>
-          <a:p>
-            <a:pPr lvl="0">
-              <a:defRPr/>
-            </a:pPr>
-            <a:r>
-              <a:rPr lang="en-US" altLang="ko-KR" smtClean="0"/>
-              <a:t>User – UserPassword Update</a:t>
-            </a:r>
-            <a:endParaRPr lang="ko-KR" altLang="en-US"/>
-          </a:p>
-        </p:txBody>
-      </p:sp>
-      <p:pic>
-        <p:nvPicPr>
-          <p:cNvPr id="10242" name="Picture 2" descr="C:\Users\DongKyun\Documents\GitHub\KHFinalProject\보고서\클래스\시퀀스_지선\User Password Update.png"/>
-          <p:cNvPicPr>
-            <a:picLocks noChangeAspect="1" noChangeArrowheads="1"/>
-          </p:cNvPicPr>
-          <p:nvPr/>
-        </p:nvPicPr>
-        <p:blipFill>
-          <a:blip r:embed="rId2">
-            <a:extLst>
-              <a:ext uri="{28A0092B-C50C-407E-A947-70E740481C1C}">
-                <a14:useLocalDpi xmlns:a14="http://schemas.microsoft.com/office/drawing/2010/main" val="0"/>
-              </a:ext>
-            </a:extLst>
-          </a:blip>
-          <a:srcRect/>
-          <a:stretch>
-            <a:fillRect/>
-          </a:stretch>
-        </p:blipFill>
-        <p:spPr bwMode="auto">
-          <a:xfrm>
-            <a:off x="0" y="650875"/>
-            <a:ext cx="12192000" cy="6207125"/>
-          </a:xfrm>
-          <a:prstGeom prst="rect">
-            <a:avLst/>
-          </a:prstGeom>
-          <a:noFill/>
-          <a:extLst>
-            <a:ext uri="{909E8E84-426E-40DD-AFC4-6F175D3DCCD1}">
-              <a14:hiddenFill xmlns:a14="http://schemas.microsoft.com/office/drawing/2010/main">
-                <a:solidFill>
-                  <a:srgbClr val="FFFFFF"/>
-                </a:solidFill>
-              </a14:hiddenFill>
-            </a:ext>
-          </a:extLst>
-        </p:spPr>
-      </p:pic>
-    </p:spTree>
-    <p:extLst>
-      <p:ext uri="{BB962C8B-B14F-4D97-AF65-F5344CB8AC3E}">
-        <p14:creationId xmlns:p14="http://schemas.microsoft.com/office/powerpoint/2010/main" val="3539437713"/>
-      </p:ext>
-    </p:extLst>
-  </p:cSld>
-  <p:clrMapOvr>
-    <a:masterClrMapping/>
-  </p:clrMapOvr>
-  <p:transition/>
-  <p:timing>
-    <p:tnLst>
-      <p:par>
-        <p:cTn id="1" dur="indefinite" restart="never" nodeType="tmRoot"/>
-      </p:par>
-    </p:tnLst>
-  </p:timing>
-</p:sld>
-</file>
-
 <file path=ppt/slides/slide18.xml><?xml version="1.0" encoding="utf-8"?>
 <p:sld xmlns:a="http://schemas.openxmlformats.org/drawingml/2006/main" xmlns:r="http://schemas.openxmlformats.org/officeDocument/2006/relationships" xmlns:p="http://schemas.openxmlformats.org/presentationml/2006/main">
   <p:cSld>
@@ -4297,202 +4327,16 @@
             </a:pPr>
             <a:r>
               <a:rPr lang="en-US" altLang="ko-KR" smtClean="0"/>
-              <a:t>User - UserDelete</a:t>
+              <a:t>User</a:t>
             </a:r>
             <a:endParaRPr lang="ko-KR" altLang="en-US"/>
           </a:p>
         </p:txBody>
       </p:sp>
-      <p:pic>
-        <p:nvPicPr>
-          <p:cNvPr id="11266" name="Picture 2" descr="C:\Users\DongKyun\Documents\GitHub\KHFinalProject\보고서\클래스\시퀀스_지선\User Delete.png"/>
-          <p:cNvPicPr>
-            <a:picLocks noChangeAspect="1" noChangeArrowheads="1"/>
-          </p:cNvPicPr>
-          <p:nvPr/>
-        </p:nvPicPr>
-        <p:blipFill>
-          <a:blip r:embed="rId2">
-            <a:extLst>
-              <a:ext uri="{28A0092B-C50C-407E-A947-70E740481C1C}">
-                <a14:useLocalDpi xmlns:a14="http://schemas.microsoft.com/office/drawing/2010/main" val="0"/>
-              </a:ext>
-            </a:extLst>
-          </a:blip>
-          <a:srcRect/>
-          <a:stretch>
-            <a:fillRect/>
-          </a:stretch>
-        </p:blipFill>
-        <p:spPr bwMode="auto">
-          <a:xfrm>
-            <a:off x="0" y="650874"/>
-            <a:ext cx="12192000" cy="6207125"/>
-          </a:xfrm>
-          <a:prstGeom prst="rect">
-            <a:avLst/>
-          </a:prstGeom>
-          <a:noFill/>
-          <a:extLst>
-            <a:ext uri="{909E8E84-426E-40DD-AFC4-6F175D3DCCD1}">
-              <a14:hiddenFill xmlns:a14="http://schemas.microsoft.com/office/drawing/2010/main">
-                <a:solidFill>
-                  <a:srgbClr val="FFFFFF"/>
-                </a:solidFill>
-              </a14:hiddenFill>
-            </a:ext>
-          </a:extLst>
-        </p:spPr>
-      </p:pic>
     </p:spTree>
     <p:extLst>
       <p:ext uri="{BB962C8B-B14F-4D97-AF65-F5344CB8AC3E}">
-        <p14:creationId xmlns:p14="http://schemas.microsoft.com/office/powerpoint/2010/main" val="3595958162"/>
-      </p:ext>
-    </p:extLst>
-  </p:cSld>
-  <p:clrMapOvr>
-    <a:masterClrMapping/>
-  </p:clrMapOvr>
-  <p:transition/>
-  <p:timing>
-    <p:tnLst>
-      <p:par>
-        <p:cTn id="1" dur="indefinite" restart="never" nodeType="tmRoot"/>
-      </p:par>
-    </p:tnLst>
-  </p:timing>
-</p:sld>
-</file>
-
-<file path=ppt/slides/slide19.xml><?xml version="1.0" encoding="utf-8"?>
-<p:sld xmlns:a="http://schemas.openxmlformats.org/drawingml/2006/main" xmlns:r="http://schemas.openxmlformats.org/officeDocument/2006/relationships" xmlns:p="http://schemas.openxmlformats.org/presentationml/2006/main">
-  <p:cSld>
-    <p:spTree>
-      <p:nvGrpSpPr>
-        <p:cNvPr id="1" name=""/>
-        <p:cNvGrpSpPr/>
-        <p:nvPr/>
-      </p:nvGrpSpPr>
-      <p:grpSpPr>
-        <a:xfrm>
-          <a:off x="0" y="0"/>
-          <a:ext cx="0" cy="0"/>
-          <a:chOff x="0" y="0"/>
-          <a:chExt cx="0" cy="0"/>
-        </a:xfrm>
-      </p:grpSpPr>
-      <p:sp>
-        <p:nvSpPr>
-          <p:cNvPr id="4" name="제목 3"/>
-          <p:cNvSpPr>
-            <a:spLocks noGrp="1"/>
-          </p:cNvSpPr>
-          <p:nvPr>
-            <p:ph type="title"/>
-          </p:nvPr>
-        </p:nvSpPr>
-        <p:spPr>
-          <a:xfrm>
-            <a:off x="250190" y="0"/>
-            <a:ext cx="3373755" cy="650875"/>
-          </a:xfrm>
-        </p:spPr>
-        <p:txBody>
-          <a:bodyPr anchor="ctr">
-            <a:normAutofit/>
-          </a:bodyPr>
-          <a:lstStyle/>
-          <a:p>
-            <a:pPr lvl="0">
-              <a:defRPr/>
-            </a:pPr>
-            <a:r>
-              <a:rPr lang="ko-KR" altLang="en-US" sz="2800" smtClean="0"/>
-              <a:t>시퀀스 다이어그램</a:t>
-            </a:r>
-            <a:endParaRPr lang="ko-KR" altLang="en-US" sz="2800"/>
-          </a:p>
-        </p:txBody>
-      </p:sp>
-      <p:sp>
-        <p:nvSpPr>
-          <p:cNvPr id="6" name="텍스트 개체 틀 4"/>
-          <p:cNvSpPr>
-            <a:spLocks noGrp="1"/>
-          </p:cNvSpPr>
-          <p:nvPr>
-            <p:ph type="body" sz="half" idx="2"/>
-          </p:nvPr>
-        </p:nvSpPr>
-        <p:spPr>
-          <a:xfrm>
-            <a:off x="3424555" y="0"/>
-            <a:ext cx="3931920" cy="650875"/>
-          </a:xfrm>
-        </p:spPr>
-        <p:txBody>
-          <a:bodyPr anchor="ctr">
-            <a:normAutofit/>
-          </a:bodyPr>
-          <a:lstStyle/>
-          <a:p>
-            <a:pPr lvl="0">
-              <a:defRPr/>
-            </a:pPr>
-            <a:r>
-              <a:rPr lang="en-US" altLang="ko-KR" smtClean="0"/>
-              <a:t>User – User Schedule View</a:t>
-            </a:r>
-            <a:endParaRPr lang="ko-KR" altLang="en-US"/>
-          </a:p>
-        </p:txBody>
-      </p:sp>
-      <p:pic>
-        <p:nvPicPr>
-          <p:cNvPr id="12290" name="Picture 2" descr="C:\Users\DongKyun\Documents\GitHub\KHFinalProject\보고서\클래스\시퀀스_지선\User Schedule View.png"/>
-          <p:cNvPicPr>
-            <a:picLocks noChangeAspect="1" noChangeArrowheads="1"/>
-          </p:cNvPicPr>
-          <p:nvPr/>
-        </p:nvPicPr>
-        <p:blipFill>
-          <a:blip r:embed="rId2">
-            <a:extLst>
-              <a:ext uri="{28A0092B-C50C-407E-A947-70E740481C1C}">
-                <a14:useLocalDpi xmlns:a14="http://schemas.microsoft.com/office/drawing/2010/main" val="0"/>
-              </a:ext>
-            </a:extLst>
-          </a:blip>
-          <a:srcRect/>
-          <a:stretch>
-            <a:fillRect/>
-          </a:stretch>
-        </p:blipFill>
-        <p:spPr bwMode="auto">
-          <a:xfrm>
-            <a:off x="0" y="650874"/>
-            <a:ext cx="12215746" cy="6207126"/>
-          </a:xfrm>
-          <a:prstGeom prst="rect">
-            <a:avLst/>
-          </a:prstGeom>
-          <a:noFill/>
-          <a:extLst>
-            <a:ext uri="{909E8E84-426E-40DD-AFC4-6F175D3DCCD1}">
-              <a14:hiddenFill xmlns:a14="http://schemas.microsoft.com/office/drawing/2010/main">
-                <a:solidFill>
-                  <a:srgbClr val="FFFFFF"/>
-                </a:solidFill>
-              </a14:hiddenFill>
-            </a:ext>
-          </a:extLst>
-        </p:spPr>
-      </p:pic>
-    </p:spTree>
-    <p:extLst>
-      <p:ext uri="{BB962C8B-B14F-4D97-AF65-F5344CB8AC3E}">
-        <p14:creationId xmlns:p14="http://schemas.microsoft.com/office/powerpoint/2010/main" val="991108436"/>
+        <p14:creationId xmlns:p14="http://schemas.microsoft.com/office/powerpoint/2010/main" val="3649887602"/>
       </p:ext>
     </p:extLst>
   </p:cSld>
@@ -4580,7 +4424,7 @@
           <p:cNvPr id="21" name="직사각형 20">
             <a:extLst>
               <a:ext uri="{FF2B5EF4-FFF2-40B4-BE49-F238E27FC236}">
-                <a16:creationId xmlns="" xmlns:a16="http://schemas.microsoft.com/office/drawing/2014/main" xmlns:p14="http://schemas.microsoft.com/office/powerpoint/2010/main" id="{63D8309B-220E-4F90-B697-6E756550EC24}"/>
+                <a16:creationId xmlns:p14="http://schemas.microsoft.com/office/powerpoint/2010/main" xmlns:a16="http://schemas.microsoft.com/office/drawing/2014/main" xmlns="" id="{63D8309B-220E-4F90-B697-6E756550EC24}"/>
               </a:ext>
             </a:extLst>
           </p:cNvPr>
@@ -4736,7 +4580,7 @@
             <p:cNvPr id="6" name="TextBox 5">
               <a:extLst>
                 <a:ext uri="{FF2B5EF4-FFF2-40B4-BE49-F238E27FC236}">
-                  <a16:creationId xmlns="" xmlns:a16="http://schemas.microsoft.com/office/drawing/2014/main" xmlns:p14="http://schemas.microsoft.com/office/powerpoint/2010/main" id="{BCB0E9E3-FAB5-4E31-83EE-08A0FE55BB4A}"/>
+                  <a16:creationId xmlns:p14="http://schemas.microsoft.com/office/powerpoint/2010/main" xmlns:a16="http://schemas.microsoft.com/office/drawing/2014/main" xmlns="" id="{BCB0E9E3-FAB5-4E31-83EE-08A0FE55BB4A}"/>
                 </a:ext>
               </a:extLst>
             </p:cNvPr>
@@ -4861,7 +4705,7 @@
             <p:cNvPr id="20" name="TextBox 19">
               <a:extLst>
                 <a:ext uri="{FF2B5EF4-FFF2-40B4-BE49-F238E27FC236}">
-                  <a16:creationId xmlns="" xmlns:a16="http://schemas.microsoft.com/office/drawing/2014/main" xmlns:p14="http://schemas.microsoft.com/office/powerpoint/2010/main" id="{BCB0E9E3-FAB5-4E31-83EE-08A0FE55BB4A}"/>
+                  <a16:creationId xmlns:p14="http://schemas.microsoft.com/office/powerpoint/2010/main" xmlns:a16="http://schemas.microsoft.com/office/drawing/2014/main" xmlns="" id="{BCB0E9E3-FAB5-4E31-83EE-08A0FE55BB4A}"/>
                 </a:ext>
               </a:extLst>
             </p:cNvPr>
@@ -5006,7 +4850,7 @@
             <p:cNvPr id="24" name="TextBox 23">
               <a:extLst>
                 <a:ext uri="{FF2B5EF4-FFF2-40B4-BE49-F238E27FC236}">
-                  <a16:creationId xmlns="" xmlns:a16="http://schemas.microsoft.com/office/drawing/2014/main" xmlns:p14="http://schemas.microsoft.com/office/powerpoint/2010/main" id="{BCB0E9E3-FAB5-4E31-83EE-08A0FE55BB4A}"/>
+                  <a16:creationId xmlns:p14="http://schemas.microsoft.com/office/powerpoint/2010/main" xmlns:a16="http://schemas.microsoft.com/office/drawing/2014/main" xmlns="" id="{BCB0E9E3-FAB5-4E31-83EE-08A0FE55BB4A}"/>
                 </a:ext>
               </a:extLst>
             </p:cNvPr>
@@ -5078,1043 +4922,6 @@
 </p:sld>
 </file>
 
-<file path=ppt/slides/slide20.xml><?xml version="1.0" encoding="utf-8"?>
-<p:sld xmlns:a="http://schemas.openxmlformats.org/drawingml/2006/main" xmlns:r="http://schemas.openxmlformats.org/officeDocument/2006/relationships" xmlns:p="http://schemas.openxmlformats.org/presentationml/2006/main">
-  <p:cSld>
-    <p:spTree>
-      <p:nvGrpSpPr>
-        <p:cNvPr id="1" name=""/>
-        <p:cNvGrpSpPr/>
-        <p:nvPr/>
-      </p:nvGrpSpPr>
-      <p:grpSpPr>
-        <a:xfrm>
-          <a:off x="0" y="0"/>
-          <a:ext cx="0" cy="0"/>
-          <a:chOff x="0" y="0"/>
-          <a:chExt cx="0" cy="0"/>
-        </a:xfrm>
-      </p:grpSpPr>
-      <p:sp>
-        <p:nvSpPr>
-          <p:cNvPr id="4" name="제목 3"/>
-          <p:cNvSpPr>
-            <a:spLocks noGrp="1"/>
-          </p:cNvSpPr>
-          <p:nvPr>
-            <p:ph type="title"/>
-          </p:nvPr>
-        </p:nvSpPr>
-        <p:spPr>
-          <a:xfrm>
-            <a:off x="250190" y="0"/>
-            <a:ext cx="3373755" cy="650875"/>
-          </a:xfrm>
-        </p:spPr>
-        <p:txBody>
-          <a:bodyPr anchor="ctr">
-            <a:normAutofit/>
-          </a:bodyPr>
-          <a:lstStyle/>
-          <a:p>
-            <a:pPr lvl="0">
-              <a:defRPr/>
-            </a:pPr>
-            <a:r>
-              <a:rPr lang="ko-KR" altLang="en-US" sz="2800" smtClean="0"/>
-              <a:t>시퀀스 다이어그램</a:t>
-            </a:r>
-            <a:endParaRPr lang="ko-KR" altLang="en-US" sz="2800"/>
-          </a:p>
-        </p:txBody>
-      </p:sp>
-      <p:sp>
-        <p:nvSpPr>
-          <p:cNvPr id="6" name="텍스트 개체 틀 4"/>
-          <p:cNvSpPr>
-            <a:spLocks noGrp="1"/>
-          </p:cNvSpPr>
-          <p:nvPr>
-            <p:ph type="body" sz="half" idx="2"/>
-          </p:nvPr>
-        </p:nvSpPr>
-        <p:spPr>
-          <a:xfrm>
-            <a:off x="3424555" y="0"/>
-            <a:ext cx="3931920" cy="650875"/>
-          </a:xfrm>
-        </p:spPr>
-        <p:txBody>
-          <a:bodyPr anchor="ctr">
-            <a:normAutofit/>
-          </a:bodyPr>
-          <a:lstStyle/>
-          <a:p>
-            <a:pPr lvl="0">
-              <a:defRPr/>
-            </a:pPr>
-            <a:r>
-              <a:rPr lang="en-US" altLang="ko-KR" smtClean="0"/>
-              <a:t>User – User Update</a:t>
-            </a:r>
-            <a:endParaRPr lang="ko-KR" altLang="en-US"/>
-          </a:p>
-        </p:txBody>
-      </p:sp>
-      <p:pic>
-        <p:nvPicPr>
-          <p:cNvPr id="13314" name="Picture 2" descr="C:\Users\DongKyun\Documents\GitHub\KHFinalProject\보고서\클래스\시퀀스_지선\User Update.png"/>
-          <p:cNvPicPr>
-            <a:picLocks noChangeAspect="1" noChangeArrowheads="1"/>
-          </p:cNvPicPr>
-          <p:nvPr/>
-        </p:nvPicPr>
-        <p:blipFill>
-          <a:blip r:embed="rId2">
-            <a:extLst>
-              <a:ext uri="{28A0092B-C50C-407E-A947-70E740481C1C}">
-                <a14:useLocalDpi xmlns:a14="http://schemas.microsoft.com/office/drawing/2010/main" val="0"/>
-              </a:ext>
-            </a:extLst>
-          </a:blip>
-          <a:srcRect/>
-          <a:stretch>
-            <a:fillRect/>
-          </a:stretch>
-        </p:blipFill>
-        <p:spPr bwMode="auto">
-          <a:xfrm>
-            <a:off x="0" y="650874"/>
-            <a:ext cx="12192000" cy="6207125"/>
-          </a:xfrm>
-          <a:prstGeom prst="rect">
-            <a:avLst/>
-          </a:prstGeom>
-          <a:noFill/>
-          <a:extLst>
-            <a:ext uri="{909E8E84-426E-40DD-AFC4-6F175D3DCCD1}">
-              <a14:hiddenFill xmlns:a14="http://schemas.microsoft.com/office/drawing/2010/main">
-                <a:solidFill>
-                  <a:srgbClr val="FFFFFF"/>
-                </a:solidFill>
-              </a14:hiddenFill>
-            </a:ext>
-          </a:extLst>
-        </p:spPr>
-      </p:pic>
-    </p:spTree>
-    <p:extLst>
-      <p:ext uri="{BB962C8B-B14F-4D97-AF65-F5344CB8AC3E}">
-        <p14:creationId xmlns:p14="http://schemas.microsoft.com/office/powerpoint/2010/main" val="3089605658"/>
-      </p:ext>
-    </p:extLst>
-  </p:cSld>
-  <p:clrMapOvr>
-    <a:masterClrMapping/>
-  </p:clrMapOvr>
-  <p:transition/>
-  <p:timing>
-    <p:tnLst>
-      <p:par>
-        <p:cTn id="1" dur="indefinite" restart="never" nodeType="tmRoot"/>
-      </p:par>
-    </p:tnLst>
-  </p:timing>
-</p:sld>
-</file>
-
-<file path=ppt/slides/slide21.xml><?xml version="1.0" encoding="utf-8"?>
-<p:sld xmlns:a="http://schemas.openxmlformats.org/drawingml/2006/main" xmlns:r="http://schemas.openxmlformats.org/officeDocument/2006/relationships" xmlns:p="http://schemas.openxmlformats.org/presentationml/2006/main">
-  <p:cSld>
-    <p:spTree>
-      <p:nvGrpSpPr>
-        <p:cNvPr id="1" name=""/>
-        <p:cNvGrpSpPr/>
-        <p:nvPr/>
-      </p:nvGrpSpPr>
-      <p:grpSpPr>
-        <a:xfrm>
-          <a:off x="0" y="0"/>
-          <a:ext cx="0" cy="0"/>
-          <a:chOff x="0" y="0"/>
-          <a:chExt cx="0" cy="0"/>
-        </a:xfrm>
-      </p:grpSpPr>
-      <p:sp>
-        <p:nvSpPr>
-          <p:cNvPr id="4" name="제목 3"/>
-          <p:cNvSpPr>
-            <a:spLocks noGrp="1"/>
-          </p:cNvSpPr>
-          <p:nvPr>
-            <p:ph type="title"/>
-          </p:nvPr>
-        </p:nvSpPr>
-        <p:spPr>
-          <a:xfrm>
-            <a:off x="250190" y="0"/>
-            <a:ext cx="3373755" cy="650875"/>
-          </a:xfrm>
-        </p:spPr>
-        <p:txBody>
-          <a:bodyPr anchor="ctr">
-            <a:normAutofit/>
-          </a:bodyPr>
-          <a:lstStyle/>
-          <a:p>
-            <a:pPr lvl="0">
-              <a:defRPr/>
-            </a:pPr>
-            <a:r>
-              <a:rPr lang="ko-KR" altLang="en-US" sz="2800" smtClean="0"/>
-              <a:t>시퀀스 다이어그램</a:t>
-            </a:r>
-            <a:endParaRPr lang="ko-KR" altLang="en-US" sz="2800"/>
-          </a:p>
-        </p:txBody>
-      </p:sp>
-      <p:sp>
-        <p:nvSpPr>
-          <p:cNvPr id="6" name="텍스트 개체 틀 4"/>
-          <p:cNvSpPr>
-            <a:spLocks noGrp="1"/>
-          </p:cNvSpPr>
-          <p:nvPr>
-            <p:ph type="body" sz="half" idx="2"/>
-          </p:nvPr>
-        </p:nvSpPr>
-        <p:spPr>
-          <a:xfrm>
-            <a:off x="3424555" y="0"/>
-            <a:ext cx="3931920" cy="650875"/>
-          </a:xfrm>
-        </p:spPr>
-        <p:txBody>
-          <a:bodyPr anchor="ctr">
-            <a:normAutofit/>
-          </a:bodyPr>
-          <a:lstStyle/>
-          <a:p>
-            <a:pPr lvl="0">
-              <a:defRPr/>
-            </a:pPr>
-            <a:r>
-              <a:rPr lang="en-US" altLang="ko-KR" smtClean="0"/>
-              <a:t>Gym</a:t>
-            </a:r>
-            <a:endParaRPr lang="ko-KR" altLang="en-US"/>
-          </a:p>
-        </p:txBody>
-      </p:sp>
-    </p:spTree>
-    <p:extLst>
-      <p:ext uri="{BB962C8B-B14F-4D97-AF65-F5344CB8AC3E}">
-        <p14:creationId xmlns:p14="http://schemas.microsoft.com/office/powerpoint/2010/main" val="931727686"/>
-      </p:ext>
-    </p:extLst>
-  </p:cSld>
-  <p:clrMapOvr>
-    <a:masterClrMapping/>
-  </p:clrMapOvr>
-  <p:transition/>
-  <p:timing>
-    <p:tnLst>
-      <p:par>
-        <p:cTn id="1" dur="indefinite" restart="never" nodeType="tmRoot"/>
-      </p:par>
-    </p:tnLst>
-  </p:timing>
-</p:sld>
-</file>
-
-<file path=ppt/slides/slide22.xml><?xml version="1.0" encoding="utf-8"?>
-<p:sld xmlns:a="http://schemas.openxmlformats.org/drawingml/2006/main" xmlns:r="http://schemas.openxmlformats.org/officeDocument/2006/relationships" xmlns:p="http://schemas.openxmlformats.org/presentationml/2006/main">
-  <p:cSld>
-    <p:spTree>
-      <p:nvGrpSpPr>
-        <p:cNvPr id="1" name=""/>
-        <p:cNvGrpSpPr/>
-        <p:nvPr/>
-      </p:nvGrpSpPr>
-      <p:grpSpPr>
-        <a:xfrm>
-          <a:off x="0" y="0"/>
-          <a:ext cx="0" cy="0"/>
-          <a:chOff x="0" y="0"/>
-          <a:chExt cx="0" cy="0"/>
-        </a:xfrm>
-      </p:grpSpPr>
-      <p:sp>
-        <p:nvSpPr>
-          <p:cNvPr id="4" name="제목 3"/>
-          <p:cNvSpPr>
-            <a:spLocks noGrp="1"/>
-          </p:cNvSpPr>
-          <p:nvPr>
-            <p:ph type="title"/>
-          </p:nvPr>
-        </p:nvSpPr>
-        <p:spPr>
-          <a:xfrm>
-            <a:off x="250190" y="0"/>
-            <a:ext cx="3373755" cy="650875"/>
-          </a:xfrm>
-        </p:spPr>
-        <p:txBody>
-          <a:bodyPr anchor="ctr">
-            <a:normAutofit/>
-          </a:bodyPr>
-          <a:lstStyle/>
-          <a:p>
-            <a:pPr lvl="0">
-              <a:defRPr/>
-            </a:pPr>
-            <a:r>
-              <a:rPr lang="ko-KR" altLang="en-US" sz="2800" smtClean="0"/>
-              <a:t>시퀀스 다이어그램</a:t>
-            </a:r>
-            <a:endParaRPr lang="ko-KR" altLang="en-US" sz="2800"/>
-          </a:p>
-        </p:txBody>
-      </p:sp>
-      <p:sp>
-        <p:nvSpPr>
-          <p:cNvPr id="6" name="텍스트 개체 틀 4"/>
-          <p:cNvSpPr>
-            <a:spLocks noGrp="1"/>
-          </p:cNvSpPr>
-          <p:nvPr>
-            <p:ph type="body" sz="half" idx="2"/>
-          </p:nvPr>
-        </p:nvSpPr>
-        <p:spPr>
-          <a:xfrm>
-            <a:off x="3424555" y="0"/>
-            <a:ext cx="3931920" cy="650875"/>
-          </a:xfrm>
-        </p:spPr>
-        <p:txBody>
-          <a:bodyPr anchor="ctr">
-            <a:normAutofit/>
-          </a:bodyPr>
-          <a:lstStyle/>
-          <a:p>
-            <a:pPr lvl="0">
-              <a:defRPr/>
-            </a:pPr>
-            <a:r>
-              <a:rPr lang="en-US" altLang="ko-KR" smtClean="0"/>
-              <a:t>Community - CommunityBoardList</a:t>
-            </a:r>
-            <a:endParaRPr lang="ko-KR" altLang="en-US"/>
-          </a:p>
-        </p:txBody>
-      </p:sp>
-      <p:pic>
-        <p:nvPicPr>
-          <p:cNvPr id="3074" name="Picture 2" descr="C:\Users\DongKyun\Documents\GitHub\KHFinalProject\보고서\클래스\리스트.png"/>
-          <p:cNvPicPr>
-            <a:picLocks noChangeAspect="1" noChangeArrowheads="1"/>
-          </p:cNvPicPr>
-          <p:nvPr/>
-        </p:nvPicPr>
-        <p:blipFill>
-          <a:blip r:embed="rId2">
-            <a:extLst>
-              <a:ext uri="{28A0092B-C50C-407E-A947-70E740481C1C}">
-                <a14:useLocalDpi xmlns:a14="http://schemas.microsoft.com/office/drawing/2010/main" val="0"/>
-              </a:ext>
-            </a:extLst>
-          </a:blip>
-          <a:srcRect/>
-          <a:stretch>
-            <a:fillRect/>
-          </a:stretch>
-        </p:blipFill>
-        <p:spPr bwMode="auto">
-          <a:xfrm>
-            <a:off x="0" y="650874"/>
-            <a:ext cx="12192000" cy="6207125"/>
-          </a:xfrm>
-          <a:prstGeom prst="rect">
-            <a:avLst/>
-          </a:prstGeom>
-          <a:noFill/>
-          <a:extLst>
-            <a:ext uri="{909E8E84-426E-40DD-AFC4-6F175D3DCCD1}">
-              <a14:hiddenFill xmlns:a14="http://schemas.microsoft.com/office/drawing/2010/main">
-                <a:solidFill>
-                  <a:srgbClr val="FFFFFF"/>
-                </a:solidFill>
-              </a14:hiddenFill>
-            </a:ext>
-          </a:extLst>
-        </p:spPr>
-      </p:pic>
-    </p:spTree>
-    <p:extLst>
-      <p:ext uri="{BB962C8B-B14F-4D97-AF65-F5344CB8AC3E}">
-        <p14:creationId xmlns:p14="http://schemas.microsoft.com/office/powerpoint/2010/main" val="3788117990"/>
-      </p:ext>
-    </p:extLst>
-  </p:cSld>
-  <p:clrMapOvr>
-    <a:masterClrMapping/>
-  </p:clrMapOvr>
-  <p:transition/>
-  <p:timing>
-    <p:tnLst>
-      <p:par>
-        <p:cTn id="1" dur="indefinite" restart="never" nodeType="tmRoot"/>
-      </p:par>
-    </p:tnLst>
-  </p:timing>
-</p:sld>
-</file>
-
-<file path=ppt/slides/slide23.xml><?xml version="1.0" encoding="utf-8"?>
-<p:sld xmlns:a="http://schemas.openxmlformats.org/drawingml/2006/main" xmlns:r="http://schemas.openxmlformats.org/officeDocument/2006/relationships" xmlns:p="http://schemas.openxmlformats.org/presentationml/2006/main">
-  <p:cSld>
-    <p:spTree>
-      <p:nvGrpSpPr>
-        <p:cNvPr id="1" name=""/>
-        <p:cNvGrpSpPr/>
-        <p:nvPr/>
-      </p:nvGrpSpPr>
-      <p:grpSpPr>
-        <a:xfrm>
-          <a:off x="0" y="0"/>
-          <a:ext cx="0" cy="0"/>
-          <a:chOff x="0" y="0"/>
-          <a:chExt cx="0" cy="0"/>
-        </a:xfrm>
-      </p:grpSpPr>
-      <p:sp>
-        <p:nvSpPr>
-          <p:cNvPr id="4" name="제목 3"/>
-          <p:cNvSpPr>
-            <a:spLocks noGrp="1"/>
-          </p:cNvSpPr>
-          <p:nvPr>
-            <p:ph type="title"/>
-          </p:nvPr>
-        </p:nvSpPr>
-        <p:spPr>
-          <a:xfrm>
-            <a:off x="250190" y="0"/>
-            <a:ext cx="3373755" cy="650875"/>
-          </a:xfrm>
-        </p:spPr>
-        <p:txBody>
-          <a:bodyPr anchor="ctr">
-            <a:normAutofit/>
-          </a:bodyPr>
-          <a:lstStyle/>
-          <a:p>
-            <a:pPr lvl="0">
-              <a:defRPr/>
-            </a:pPr>
-            <a:r>
-              <a:rPr lang="ko-KR" altLang="en-US" sz="2800" smtClean="0"/>
-              <a:t>시퀀스 다이어그램</a:t>
-            </a:r>
-            <a:endParaRPr lang="ko-KR" altLang="en-US" sz="2800"/>
-          </a:p>
-        </p:txBody>
-      </p:sp>
-      <p:sp>
-        <p:nvSpPr>
-          <p:cNvPr id="6" name="텍스트 개체 틀 4"/>
-          <p:cNvSpPr>
-            <a:spLocks noGrp="1"/>
-          </p:cNvSpPr>
-          <p:nvPr>
-            <p:ph type="body" sz="half" idx="2"/>
-          </p:nvPr>
-        </p:nvSpPr>
-        <p:spPr>
-          <a:xfrm>
-            <a:off x="3424555" y="0"/>
-            <a:ext cx="3931920" cy="650875"/>
-          </a:xfrm>
-        </p:spPr>
-        <p:txBody>
-          <a:bodyPr anchor="ctr">
-            <a:normAutofit/>
-          </a:bodyPr>
-          <a:lstStyle/>
-          <a:p>
-            <a:pPr lvl="0">
-              <a:defRPr/>
-            </a:pPr>
-            <a:r>
-              <a:rPr lang="en-US" altLang="ko-KR" smtClean="0"/>
-              <a:t>Community - CommunityBoardInsert</a:t>
-            </a:r>
-            <a:endParaRPr lang="ko-KR" altLang="en-US"/>
-          </a:p>
-        </p:txBody>
-      </p:sp>
-      <p:pic>
-        <p:nvPicPr>
-          <p:cNvPr id="4098" name="Picture 2" descr="C:\Users\DongKyun\Documents\GitHub\KHFinalProject\보고서\클래스\삽입.png"/>
-          <p:cNvPicPr>
-            <a:picLocks noChangeAspect="1" noChangeArrowheads="1"/>
-          </p:cNvPicPr>
-          <p:nvPr/>
-        </p:nvPicPr>
-        <p:blipFill>
-          <a:blip r:embed="rId2">
-            <a:extLst>
-              <a:ext uri="{28A0092B-C50C-407E-A947-70E740481C1C}">
-                <a14:useLocalDpi xmlns:a14="http://schemas.microsoft.com/office/drawing/2010/main" val="0"/>
-              </a:ext>
-            </a:extLst>
-          </a:blip>
-          <a:srcRect/>
-          <a:stretch>
-            <a:fillRect/>
-          </a:stretch>
-        </p:blipFill>
-        <p:spPr bwMode="auto">
-          <a:xfrm>
-            <a:off x="0" y="650874"/>
-            <a:ext cx="12192834" cy="6207125"/>
-          </a:xfrm>
-          <a:prstGeom prst="rect">
-            <a:avLst/>
-          </a:prstGeom>
-          <a:noFill/>
-          <a:extLst>
-            <a:ext uri="{909E8E84-426E-40DD-AFC4-6F175D3DCCD1}">
-              <a14:hiddenFill xmlns:a14="http://schemas.microsoft.com/office/drawing/2010/main">
-                <a:solidFill>
-                  <a:srgbClr val="FFFFFF"/>
-                </a:solidFill>
-              </a14:hiddenFill>
-            </a:ext>
-          </a:extLst>
-        </p:spPr>
-      </p:pic>
-    </p:spTree>
-    <p:extLst>
-      <p:ext uri="{BB962C8B-B14F-4D97-AF65-F5344CB8AC3E}">
-        <p14:creationId xmlns:p14="http://schemas.microsoft.com/office/powerpoint/2010/main" val="415682292"/>
-      </p:ext>
-    </p:extLst>
-  </p:cSld>
-  <p:clrMapOvr>
-    <a:masterClrMapping/>
-  </p:clrMapOvr>
-  <p:transition/>
-  <p:timing>
-    <p:tnLst>
-      <p:par>
-        <p:cTn id="1" dur="indefinite" restart="never" nodeType="tmRoot"/>
-      </p:par>
-    </p:tnLst>
-  </p:timing>
-</p:sld>
-</file>
-
-<file path=ppt/slides/slide24.xml><?xml version="1.0" encoding="utf-8"?>
-<p:sld xmlns:a="http://schemas.openxmlformats.org/drawingml/2006/main" xmlns:r="http://schemas.openxmlformats.org/officeDocument/2006/relationships" xmlns:p="http://schemas.openxmlformats.org/presentationml/2006/main">
-  <p:cSld>
-    <p:spTree>
-      <p:nvGrpSpPr>
-        <p:cNvPr id="1" name=""/>
-        <p:cNvGrpSpPr/>
-        <p:nvPr/>
-      </p:nvGrpSpPr>
-      <p:grpSpPr>
-        <a:xfrm>
-          <a:off x="0" y="0"/>
-          <a:ext cx="0" cy="0"/>
-          <a:chOff x="0" y="0"/>
-          <a:chExt cx="0" cy="0"/>
-        </a:xfrm>
-      </p:grpSpPr>
-      <p:sp>
-        <p:nvSpPr>
-          <p:cNvPr id="4" name="제목 3"/>
-          <p:cNvSpPr>
-            <a:spLocks noGrp="1"/>
-          </p:cNvSpPr>
-          <p:nvPr>
-            <p:ph type="title"/>
-          </p:nvPr>
-        </p:nvSpPr>
-        <p:spPr>
-          <a:xfrm>
-            <a:off x="250190" y="0"/>
-            <a:ext cx="3373755" cy="650875"/>
-          </a:xfrm>
-        </p:spPr>
-        <p:txBody>
-          <a:bodyPr anchor="ctr">
-            <a:normAutofit/>
-          </a:bodyPr>
-          <a:lstStyle/>
-          <a:p>
-            <a:pPr lvl="0">
-              <a:defRPr/>
-            </a:pPr>
-            <a:r>
-              <a:rPr lang="ko-KR" altLang="en-US" sz="2800" smtClean="0"/>
-              <a:t>시퀀스 다이어그램</a:t>
-            </a:r>
-            <a:endParaRPr lang="ko-KR" altLang="en-US" sz="2800"/>
-          </a:p>
-        </p:txBody>
-      </p:sp>
-      <p:sp>
-        <p:nvSpPr>
-          <p:cNvPr id="6" name="텍스트 개체 틀 4"/>
-          <p:cNvSpPr>
-            <a:spLocks noGrp="1"/>
-          </p:cNvSpPr>
-          <p:nvPr>
-            <p:ph type="body" sz="half" idx="2"/>
-          </p:nvPr>
-        </p:nvSpPr>
-        <p:spPr>
-          <a:xfrm>
-            <a:off x="3424555" y="0"/>
-            <a:ext cx="3931920" cy="650875"/>
-          </a:xfrm>
-        </p:spPr>
-        <p:txBody>
-          <a:bodyPr anchor="ctr">
-            <a:normAutofit fontScale="92500"/>
-          </a:bodyPr>
-          <a:lstStyle/>
-          <a:p>
-            <a:pPr lvl="0">
-              <a:defRPr/>
-            </a:pPr>
-            <a:r>
-              <a:rPr lang="en-US" altLang="ko-KR" smtClean="0"/>
-              <a:t>Community - CommunityBoardUpdate</a:t>
-            </a:r>
-            <a:endParaRPr lang="ko-KR" altLang="en-US"/>
-          </a:p>
-        </p:txBody>
-      </p:sp>
-      <p:pic>
-        <p:nvPicPr>
-          <p:cNvPr id="5122" name="Picture 2" descr="C:\Users\DongKyun\Documents\GitHub\KHFinalProject\보고서\클래스\수정.png"/>
-          <p:cNvPicPr>
-            <a:picLocks noChangeAspect="1" noChangeArrowheads="1"/>
-          </p:cNvPicPr>
-          <p:nvPr/>
-        </p:nvPicPr>
-        <p:blipFill>
-          <a:blip r:embed="rId2">
-            <a:extLst>
-              <a:ext uri="{28A0092B-C50C-407E-A947-70E740481C1C}">
-                <a14:useLocalDpi xmlns:a14="http://schemas.microsoft.com/office/drawing/2010/main" val="0"/>
-              </a:ext>
-            </a:extLst>
-          </a:blip>
-          <a:srcRect/>
-          <a:stretch>
-            <a:fillRect/>
-          </a:stretch>
-        </p:blipFill>
-        <p:spPr bwMode="auto">
-          <a:xfrm>
-            <a:off x="0" y="650875"/>
-            <a:ext cx="12192000" cy="6207125"/>
-          </a:xfrm>
-          <a:prstGeom prst="rect">
-            <a:avLst/>
-          </a:prstGeom>
-          <a:noFill/>
-          <a:extLst>
-            <a:ext uri="{909E8E84-426E-40DD-AFC4-6F175D3DCCD1}">
-              <a14:hiddenFill xmlns:a14="http://schemas.microsoft.com/office/drawing/2010/main">
-                <a:solidFill>
-                  <a:srgbClr val="FFFFFF"/>
-                </a:solidFill>
-              </a14:hiddenFill>
-            </a:ext>
-          </a:extLst>
-        </p:spPr>
-      </p:pic>
-    </p:spTree>
-    <p:extLst>
-      <p:ext uri="{BB962C8B-B14F-4D97-AF65-F5344CB8AC3E}">
-        <p14:creationId xmlns:p14="http://schemas.microsoft.com/office/powerpoint/2010/main" val="1798126384"/>
-      </p:ext>
-    </p:extLst>
-  </p:cSld>
-  <p:clrMapOvr>
-    <a:masterClrMapping/>
-  </p:clrMapOvr>
-  <p:transition/>
-  <p:timing>
-    <p:tnLst>
-      <p:par>
-        <p:cTn id="1" dur="indefinite" restart="never" nodeType="tmRoot"/>
-      </p:par>
-    </p:tnLst>
-  </p:timing>
-</p:sld>
-</file>
-
-<file path=ppt/slides/slide25.xml><?xml version="1.0" encoding="utf-8"?>
-<p:sld xmlns:a="http://schemas.openxmlformats.org/drawingml/2006/main" xmlns:r="http://schemas.openxmlformats.org/officeDocument/2006/relationships" xmlns:p="http://schemas.openxmlformats.org/presentationml/2006/main">
-  <p:cSld>
-    <p:spTree>
-      <p:nvGrpSpPr>
-        <p:cNvPr id="1" name=""/>
-        <p:cNvGrpSpPr/>
-        <p:nvPr/>
-      </p:nvGrpSpPr>
-      <p:grpSpPr>
-        <a:xfrm>
-          <a:off x="0" y="0"/>
-          <a:ext cx="0" cy="0"/>
-          <a:chOff x="0" y="0"/>
-          <a:chExt cx="0" cy="0"/>
-        </a:xfrm>
-      </p:grpSpPr>
-      <p:sp>
-        <p:nvSpPr>
-          <p:cNvPr id="4" name="제목 3"/>
-          <p:cNvSpPr>
-            <a:spLocks noGrp="1"/>
-          </p:cNvSpPr>
-          <p:nvPr>
-            <p:ph type="title"/>
-          </p:nvPr>
-        </p:nvSpPr>
-        <p:spPr>
-          <a:xfrm>
-            <a:off x="250190" y="0"/>
-            <a:ext cx="3373755" cy="650875"/>
-          </a:xfrm>
-        </p:spPr>
-        <p:txBody>
-          <a:bodyPr anchor="ctr">
-            <a:normAutofit/>
-          </a:bodyPr>
-          <a:lstStyle/>
-          <a:p>
-            <a:pPr lvl="0">
-              <a:defRPr/>
-            </a:pPr>
-            <a:r>
-              <a:rPr lang="ko-KR" altLang="en-US" sz="2800" smtClean="0"/>
-              <a:t>시퀀스 다이어그램</a:t>
-            </a:r>
-            <a:endParaRPr lang="ko-KR" altLang="en-US" sz="2800"/>
-          </a:p>
-        </p:txBody>
-      </p:sp>
-      <p:sp>
-        <p:nvSpPr>
-          <p:cNvPr id="6" name="텍스트 개체 틀 4"/>
-          <p:cNvSpPr>
-            <a:spLocks noGrp="1"/>
-          </p:cNvSpPr>
-          <p:nvPr>
-            <p:ph type="body" sz="half" idx="2"/>
-          </p:nvPr>
-        </p:nvSpPr>
-        <p:spPr>
-          <a:xfrm>
-            <a:off x="3424555" y="0"/>
-            <a:ext cx="3931920" cy="650875"/>
-          </a:xfrm>
-        </p:spPr>
-        <p:txBody>
-          <a:bodyPr anchor="ctr">
-            <a:normAutofit/>
-          </a:bodyPr>
-          <a:lstStyle/>
-          <a:p>
-            <a:pPr lvl="0">
-              <a:defRPr/>
-            </a:pPr>
-            <a:r>
-              <a:rPr lang="en-US" altLang="ko-KR" smtClean="0"/>
-              <a:t>Community - CommunityBoardDelete</a:t>
-            </a:r>
-            <a:endParaRPr lang="ko-KR" altLang="en-US"/>
-          </a:p>
-        </p:txBody>
-      </p:sp>
-      <p:pic>
-        <p:nvPicPr>
-          <p:cNvPr id="6146" name="Picture 2" descr="C:\Users\DongKyun\Documents\GitHub\KHFinalProject\보고서\클래스\삭제.png"/>
-          <p:cNvPicPr>
-            <a:picLocks noChangeAspect="1" noChangeArrowheads="1"/>
-          </p:cNvPicPr>
-          <p:nvPr/>
-        </p:nvPicPr>
-        <p:blipFill>
-          <a:blip r:embed="rId2">
-            <a:extLst>
-              <a:ext uri="{28A0092B-C50C-407E-A947-70E740481C1C}">
-                <a14:useLocalDpi xmlns:a14="http://schemas.microsoft.com/office/drawing/2010/main" val="0"/>
-              </a:ext>
-            </a:extLst>
-          </a:blip>
-          <a:srcRect/>
-          <a:stretch>
-            <a:fillRect/>
-          </a:stretch>
-        </p:blipFill>
-        <p:spPr bwMode="auto">
-          <a:xfrm>
-            <a:off x="0" y="650874"/>
-            <a:ext cx="12192000" cy="6207126"/>
-          </a:xfrm>
-          <a:prstGeom prst="rect">
-            <a:avLst/>
-          </a:prstGeom>
-          <a:noFill/>
-          <a:extLst>
-            <a:ext uri="{909E8E84-426E-40DD-AFC4-6F175D3DCCD1}">
-              <a14:hiddenFill xmlns:a14="http://schemas.microsoft.com/office/drawing/2010/main">
-                <a:solidFill>
-                  <a:srgbClr val="FFFFFF"/>
-                </a:solidFill>
-              </a14:hiddenFill>
-            </a:ext>
-          </a:extLst>
-        </p:spPr>
-      </p:pic>
-    </p:spTree>
-    <p:extLst>
-      <p:ext uri="{BB962C8B-B14F-4D97-AF65-F5344CB8AC3E}">
-        <p14:creationId xmlns:p14="http://schemas.microsoft.com/office/powerpoint/2010/main" val="2796669715"/>
-      </p:ext>
-    </p:extLst>
-  </p:cSld>
-  <p:clrMapOvr>
-    <a:masterClrMapping/>
-  </p:clrMapOvr>
-  <p:transition/>
-  <p:timing>
-    <p:tnLst>
-      <p:par>
-        <p:cTn id="1" dur="indefinite" restart="never" nodeType="tmRoot"/>
-      </p:par>
-    </p:tnLst>
-  </p:timing>
-</p:sld>
-</file>
-
-<file path=ppt/slides/slide26.xml><?xml version="1.0" encoding="utf-8"?>
-<p:sld xmlns:a="http://schemas.openxmlformats.org/drawingml/2006/main" xmlns:r="http://schemas.openxmlformats.org/officeDocument/2006/relationships" xmlns:p="http://schemas.openxmlformats.org/presentationml/2006/main">
-  <p:cSld>
-    <p:spTree>
-      <p:nvGrpSpPr>
-        <p:cNvPr id="1" name=""/>
-        <p:cNvGrpSpPr/>
-        <p:nvPr/>
-      </p:nvGrpSpPr>
-      <p:grpSpPr>
-        <a:xfrm>
-          <a:off x="0" y="0"/>
-          <a:ext cx="0" cy="0"/>
-          <a:chOff x="0" y="0"/>
-          <a:chExt cx="0" cy="0"/>
-        </a:xfrm>
-      </p:grpSpPr>
-      <p:sp>
-        <p:nvSpPr>
-          <p:cNvPr id="4" name="제목 3"/>
-          <p:cNvSpPr>
-            <a:spLocks noGrp="1"/>
-          </p:cNvSpPr>
-          <p:nvPr>
-            <p:ph type="title"/>
-          </p:nvPr>
-        </p:nvSpPr>
-        <p:spPr>
-          <a:xfrm>
-            <a:off x="250190" y="0"/>
-            <a:ext cx="3373755" cy="650875"/>
-          </a:xfrm>
-        </p:spPr>
-        <p:txBody>
-          <a:bodyPr anchor="ctr">
-            <a:normAutofit/>
-          </a:bodyPr>
-          <a:lstStyle/>
-          <a:p>
-            <a:pPr lvl="0">
-              <a:defRPr/>
-            </a:pPr>
-            <a:r>
-              <a:rPr lang="ko-KR" altLang="en-US" sz="2800" smtClean="0"/>
-              <a:t>시퀀스 다이어그램</a:t>
-            </a:r>
-            <a:endParaRPr lang="ko-KR" altLang="en-US" sz="2800"/>
-          </a:p>
-        </p:txBody>
-      </p:sp>
-      <p:sp>
-        <p:nvSpPr>
-          <p:cNvPr id="6" name="텍스트 개체 틀 4"/>
-          <p:cNvSpPr>
-            <a:spLocks noGrp="1"/>
-          </p:cNvSpPr>
-          <p:nvPr>
-            <p:ph type="body" sz="half" idx="2"/>
-          </p:nvPr>
-        </p:nvSpPr>
-        <p:spPr>
-          <a:xfrm>
-            <a:off x="3424555" y="0"/>
-            <a:ext cx="3931920" cy="650875"/>
-          </a:xfrm>
-        </p:spPr>
-        <p:txBody>
-          <a:bodyPr anchor="ctr">
-            <a:normAutofit/>
-          </a:bodyPr>
-          <a:lstStyle/>
-          <a:p>
-            <a:pPr lvl="0">
-              <a:defRPr/>
-            </a:pPr>
-            <a:r>
-              <a:rPr lang="en-US" altLang="ko-KR" smtClean="0"/>
-              <a:t>Workout</a:t>
-            </a:r>
-            <a:endParaRPr lang="ko-KR" altLang="en-US"/>
-          </a:p>
-        </p:txBody>
-      </p:sp>
-    </p:spTree>
-    <p:extLst>
-      <p:ext uri="{BB962C8B-B14F-4D97-AF65-F5344CB8AC3E}">
-        <p14:creationId xmlns:p14="http://schemas.microsoft.com/office/powerpoint/2010/main" val="2648905465"/>
-      </p:ext>
-    </p:extLst>
-  </p:cSld>
-  <p:clrMapOvr>
-    <a:masterClrMapping/>
-  </p:clrMapOvr>
-  <p:transition/>
-  <p:timing>
-    <p:tnLst>
-      <p:par>
-        <p:cTn id="1" dur="indefinite" restart="never" nodeType="tmRoot"/>
-      </p:par>
-    </p:tnLst>
-  </p:timing>
-</p:sld>
-</file>
-
-<file path=ppt/slides/slide27.xml><?xml version="1.0" encoding="utf-8"?>
-<p:sld xmlns:a="http://schemas.openxmlformats.org/drawingml/2006/main" xmlns:r="http://schemas.openxmlformats.org/officeDocument/2006/relationships" xmlns:p="http://schemas.openxmlformats.org/presentationml/2006/main">
-  <p:cSld>
-    <p:spTree>
-      <p:nvGrpSpPr>
-        <p:cNvPr id="1" name=""/>
-        <p:cNvGrpSpPr/>
-        <p:nvPr/>
-      </p:nvGrpSpPr>
-      <p:grpSpPr>
-        <a:xfrm>
-          <a:off x="0" y="0"/>
-          <a:ext cx="0" cy="0"/>
-          <a:chOff x="0" y="0"/>
-          <a:chExt cx="0" cy="0"/>
-        </a:xfrm>
-      </p:grpSpPr>
-      <p:sp>
-        <p:nvSpPr>
-          <p:cNvPr id="4" name="제목 3"/>
-          <p:cNvSpPr>
-            <a:spLocks noGrp="1"/>
-          </p:cNvSpPr>
-          <p:nvPr>
-            <p:ph type="title"/>
-          </p:nvPr>
-        </p:nvSpPr>
-        <p:spPr>
-          <a:xfrm>
-            <a:off x="250190" y="0"/>
-            <a:ext cx="3373755" cy="650875"/>
-          </a:xfrm>
-        </p:spPr>
-        <p:txBody>
-          <a:bodyPr anchor="ctr">
-            <a:normAutofit/>
-          </a:bodyPr>
-          <a:lstStyle/>
-          <a:p>
-            <a:pPr lvl="0">
-              <a:defRPr/>
-            </a:pPr>
-            <a:r>
-              <a:rPr lang="ko-KR" altLang="en-US" sz="2800" smtClean="0"/>
-              <a:t>시퀀스 다이어그램</a:t>
-            </a:r>
-            <a:endParaRPr lang="ko-KR" altLang="en-US" sz="2800"/>
-          </a:p>
-        </p:txBody>
-      </p:sp>
-      <p:sp>
-        <p:nvSpPr>
-          <p:cNvPr id="6" name="텍스트 개체 틀 4"/>
-          <p:cNvSpPr>
-            <a:spLocks noGrp="1"/>
-          </p:cNvSpPr>
-          <p:nvPr>
-            <p:ph type="body" sz="half" idx="2"/>
-          </p:nvPr>
-        </p:nvSpPr>
-        <p:spPr>
-          <a:xfrm>
-            <a:off x="3424555" y="0"/>
-            <a:ext cx="3931920" cy="650875"/>
-          </a:xfrm>
-        </p:spPr>
-        <p:txBody>
-          <a:bodyPr anchor="ctr">
-            <a:normAutofit/>
-          </a:bodyPr>
-          <a:lstStyle/>
-          <a:p>
-            <a:pPr lvl="0">
-              <a:defRPr/>
-            </a:pPr>
-            <a:r>
-              <a:rPr lang="en-US" altLang="ko-KR" smtClean="0"/>
-              <a:t>Admin</a:t>
-            </a:r>
-            <a:endParaRPr lang="ko-KR" altLang="en-US"/>
-          </a:p>
-        </p:txBody>
-      </p:sp>
-    </p:spTree>
-    <p:extLst>
-      <p:ext uri="{BB962C8B-B14F-4D97-AF65-F5344CB8AC3E}">
-        <p14:creationId xmlns:p14="http://schemas.microsoft.com/office/powerpoint/2010/main" val="1019059289"/>
-      </p:ext>
-    </p:extLst>
-  </p:cSld>
-  <p:clrMapOvr>
-    <a:masterClrMapping/>
-  </p:clrMapOvr>
-  <p:transition/>
-  <p:timing>
-    <p:tnLst>
-      <p:par>
-        <p:cTn id="1" dur="indefinite" restart="never" nodeType="tmRoot"/>
-      </p:par>
-    </p:tnLst>
-  </p:timing>
-</p:sld>
-</file>
-
 <file path=ppt/slides/slide3.xml><?xml version="1.0" encoding="utf-8"?>
 <p:sld xmlns:a="http://schemas.openxmlformats.org/drawingml/2006/main" xmlns:r="http://schemas.openxmlformats.org/officeDocument/2006/relationships" xmlns:p="http://schemas.openxmlformats.org/presentationml/2006/main">
   <p:cSld>
@@ -6145,7 +4952,7 @@
           <p:cNvPr id="2" name="그룹 1">
             <a:extLst>
               <a:ext uri="{FF2B5EF4-FFF2-40B4-BE49-F238E27FC236}">
-                <a16:creationId xmlns="" xmlns:a16="http://schemas.microsoft.com/office/drawing/2014/main" xmlns:p14="http://schemas.microsoft.com/office/powerpoint/2010/main" id="{C71E5FE6-3E6D-4092-81AA-962DB5284ABF}"/>
+                <a16:creationId xmlns:p14="http://schemas.microsoft.com/office/powerpoint/2010/main" xmlns:a16="http://schemas.microsoft.com/office/drawing/2014/main" xmlns="" id="{C71E5FE6-3E6D-4092-81AA-962DB5284ABF}"/>
               </a:ext>
             </a:extLst>
           </p:cNvPr>
@@ -6227,7 +5034,7 @@
             <p:cNvPr id="6" name="TextBox 5">
               <a:extLst>
                 <a:ext uri="{FF2B5EF4-FFF2-40B4-BE49-F238E27FC236}">
-                  <a16:creationId xmlns="" xmlns:a16="http://schemas.microsoft.com/office/drawing/2014/main" xmlns:p14="http://schemas.microsoft.com/office/powerpoint/2010/main" id="{BCB0E9E3-FAB5-4E31-83EE-08A0FE55BB4A}"/>
+                  <a16:creationId xmlns:p14="http://schemas.microsoft.com/office/powerpoint/2010/main" xmlns:a16="http://schemas.microsoft.com/office/drawing/2014/main" xmlns="" id="{BCB0E9E3-FAB5-4E31-83EE-08A0FE55BB4A}"/>
                 </a:ext>
               </a:extLst>
             </p:cNvPr>
@@ -6349,47 +5156,39 @@
           </a:p>
         </p:txBody>
       </p:sp>
-      <p:pic>
-        <p:nvPicPr>
-          <p:cNvPr id="2050" name="Picture 2" descr="C:\Users\DongKyun\Documents\GitHub\KHFinalProject\보고서\클래스\패키지 다이어그램.jpg"/>
-          <p:cNvPicPr>
-            <a:picLocks noChangeAspect="1" noChangeArrowheads="1"/>
-          </p:cNvPicPr>
-          <p:nvPr/>
-        </p:nvPicPr>
-        <p:blipFill>
-          <a:blip r:embed="rId2">
-            <a:extLst>
-              <a:ext uri="{28A0092B-C50C-407E-A947-70E740481C1C}">
-                <a14:useLocalDpi xmlns:a14="http://schemas.microsoft.com/office/drawing/2010/main" val="0"/>
-              </a:ext>
-            </a:extLst>
-          </a:blip>
-          <a:srcRect/>
-          <a:stretch>
-            <a:fillRect/>
-          </a:stretch>
-        </p:blipFill>
-        <p:spPr bwMode="auto">
-          <a:xfrm>
-            <a:off x="402590" y="1009650"/>
-            <a:ext cx="11313160" cy="5600700"/>
-          </a:xfrm>
-          <a:prstGeom prst="rect">
-            <a:avLst/>
-          </a:prstGeom>
-          <a:noFill/>
-          <a:extLst>
-            <a:ext uri="{909E8E84-426E-40DD-AFC4-6F175D3DCCD1}">
-              <a14:hiddenFill xmlns:a14="http://schemas.microsoft.com/office/drawing/2010/main">
-                <a:solidFill>
-                  <a:srgbClr val="FFFFFF"/>
-                </a:solidFill>
-              </a14:hiddenFill>
-            </a:ext>
-          </a:extLst>
+      <p:sp>
+        <p:nvSpPr>
+          <p:cNvPr id="12" name="텍스트 개체 틀 4"/>
+          <p:cNvSpPr>
+            <a:spLocks noGrp="1"/>
+          </p:cNvSpPr>
+          <p:nvPr>
+            <p:ph type="body" sz="half" idx="2"/>
+          </p:nvPr>
+        </p:nvSpPr>
+        <p:spPr>
+          <a:xfrm>
+            <a:off x="3424555" y="0"/>
+            <a:ext cx="3931920" cy="650875"/>
+          </a:xfrm>
         </p:spPr>
-      </p:pic>
+        <p:txBody>
+          <a:bodyPr anchor="ctr">
+            <a:normAutofit/>
+          </a:bodyPr>
+          <a:lstStyle/>
+          <a:p>
+            <a:pPr lvl="0">
+              <a:defRPr/>
+            </a:pPr>
+            <a:r>
+              <a:rPr lang="en-US" altLang="ko-KR" smtClean="0"/>
+              <a:t>User</a:t>
+            </a:r>
+            <a:endParaRPr lang="ko-KR" altLang="en-US"/>
+          </a:p>
+        </p:txBody>
+      </p:sp>
     </p:spTree>
   </p:cSld>
   <p:clrMapOvr>
@@ -6409,14 +5208,6 @@
 <file path=ppt/slides/slide5.xml><?xml version="1.0" encoding="utf-8"?>
 <p:sld xmlns:a="http://schemas.openxmlformats.org/drawingml/2006/main" xmlns:r="http://schemas.openxmlformats.org/officeDocument/2006/relationships" xmlns:p="http://schemas.openxmlformats.org/presentationml/2006/main">
   <p:cSld>
-    <p:bg>
-      <p:bgPr>
-        <a:solidFill>
-          <a:srgbClr val="212121"/>
-        </a:solidFill>
-        <a:effectLst/>
-      </p:bgPr>
-    </p:bg>
     <p:spTree>
       <p:nvGrpSpPr>
         <p:cNvPr id="1" name=""/>
@@ -6431,155 +5222,83 @@
           <a:chExt cx="0" cy="0"/>
         </a:xfrm>
       </p:grpSpPr>
-      <p:grpSp>
-        <p:nvGrpSpPr>
-          <p:cNvPr id="2" name="그룹 1">
-            <a:extLst>
-              <a:ext uri="{FF2B5EF4-FFF2-40B4-BE49-F238E27FC236}">
-                <a16:creationId xmlns="" xmlns:a16="http://schemas.microsoft.com/office/drawing/2014/main" xmlns:p14="http://schemas.microsoft.com/office/powerpoint/2010/main" id="{C71E5FE6-3E6D-4092-81AA-962DB5284ABF}"/>
-              </a:ext>
-            </a:extLst>
-          </p:cNvPr>
-          <p:cNvGrpSpPr/>
-          <p:nvPr/>
-        </p:nvGrpSpPr>
-        <p:grpSpPr>
-          <a:xfrm>
-            <a:off x="4598353" y="2980372"/>
-            <a:ext cx="3757365" cy="564515"/>
-            <a:chOff x="4598353" y="2980372"/>
-            <a:chExt cx="3757365" cy="564515"/>
-          </a:xfrm>
-        </p:grpSpPr>
-        <p:sp>
-          <p:nvSpPr>
-            <p:cNvPr id="30" name="타원 29"/>
-            <p:cNvSpPr/>
-            <p:nvPr/>
-          </p:nvSpPr>
-          <p:spPr>
-            <a:xfrm>
-              <a:off x="4598353" y="2980372"/>
-              <a:ext cx="564832" cy="564515"/>
-            </a:xfrm>
-            <a:prstGeom prst="ellipse">
-              <a:avLst/>
-            </a:prstGeom>
-            <a:solidFill>
-              <a:schemeClr val="bg1"/>
-            </a:solidFill>
-            <a:ln>
-              <a:noFill/>
-            </a:ln>
-          </p:spPr>
-          <p:style>
-            <a:lnRef idx="2">
-              <a:schemeClr val="accent1">
-                <a:shade val="50000"/>
-              </a:schemeClr>
-            </a:lnRef>
-            <a:fillRef idx="1">
-              <a:schemeClr val="accent1"/>
-            </a:fillRef>
-            <a:effectRef idx="0">
-              <a:schemeClr val="accent1"/>
-            </a:effectRef>
-            <a:fontRef idx="minor">
-              <a:schemeClr val="lt1"/>
-            </a:fontRef>
-          </p:style>
-          <p:txBody>
-            <a:bodyPr rtlCol="0" anchor="ctr"/>
-            <a:lstStyle/>
-            <a:p>
-              <a:pPr algn="ctr"/>
-              <a:r>
-                <a:rPr lang="en-US" altLang="ko-KR" sz="2800" b="1">
-                  <a:solidFill>
-                    <a:schemeClr val="tx1"/>
-                  </a:solidFill>
-                  <a:latin typeface="THE정고딕130" panose="02020603020101020101" pitchFamily="18" charset="-127"/>
-                  <a:ea typeface="THE정고딕130" panose="02020603020101020101" pitchFamily="18" charset="-127"/>
-                </a:rPr>
-                <a:t>2</a:t>
-              </a:r>
-              <a:endParaRPr lang="ko-KR" altLang="en-US" sz="2800" b="1">
-                <a:solidFill>
-                  <a:schemeClr val="tx1"/>
-                </a:solidFill>
-                <a:latin typeface="THE정고딕130" panose="02020603020101020101" pitchFamily="18" charset="-127"/>
-                <a:ea typeface="THE정고딕130" panose="02020603020101020101" pitchFamily="18" charset="-127"/>
-              </a:endParaRPr>
-            </a:p>
-          </p:txBody>
-        </p:sp>
-        <p:sp>
-          <p:nvSpPr>
-            <p:cNvPr id="6" name="TextBox 5">
-              <a:extLst>
-                <a:ext uri="{FF2B5EF4-FFF2-40B4-BE49-F238E27FC236}">
-                  <a16:creationId xmlns="" xmlns:a16="http://schemas.microsoft.com/office/drawing/2014/main" xmlns:p14="http://schemas.microsoft.com/office/powerpoint/2010/main" id="{BCB0E9E3-FAB5-4E31-83EE-08A0FE55BB4A}"/>
-                </a:ext>
-              </a:extLst>
-            </p:cNvPr>
-            <p:cNvSpPr txBox="1"/>
-            <p:nvPr/>
-          </p:nvSpPr>
-          <p:spPr>
-            <a:xfrm>
-              <a:off x="5295265" y="3001010"/>
-              <a:ext cx="3060453" cy="523220"/>
-            </a:xfrm>
-            <a:prstGeom prst="rect">
-              <a:avLst/>
-            </a:prstGeom>
-            <a:noFill/>
-          </p:spPr>
-          <p:txBody>
-            <a:bodyPr wrap="none" rtlCol="0">
-              <a:spAutoFit/>
-            </a:bodyPr>
-            <a:lstStyle/>
-            <a:p>
-              <a:r>
-                <a:rPr lang="ko-KR" altLang="en-US" sz="2800" smtClean="0">
-                  <a:solidFill>
-                    <a:schemeClr val="bg1"/>
-                  </a:solidFill>
-                  <a:latin typeface="+mj-ea"/>
-                  <a:ea typeface="+mj-ea"/>
-                </a:rPr>
-                <a:t>클래스 다이어그램</a:t>
-              </a:r>
-              <a:endParaRPr lang="en-US" altLang="ko-KR" sz="2800">
-                <a:solidFill>
-                  <a:schemeClr val="bg1"/>
-                </a:solidFill>
-                <a:latin typeface="+mj-ea"/>
-                <a:ea typeface="+mj-ea"/>
-              </a:endParaRPr>
-            </a:p>
-          </p:txBody>
-        </p:sp>
-      </p:grpSp>
+      <p:sp>
+        <p:nvSpPr>
+          <p:cNvPr id="4" name="제목 3"/>
+          <p:cNvSpPr>
+            <a:spLocks noGrp="1"/>
+          </p:cNvSpPr>
+          <p:nvPr>
+            <p:ph type="title"/>
+          </p:nvPr>
+        </p:nvSpPr>
+        <p:spPr>
+          <a:xfrm>
+            <a:off x="250190" y="0"/>
+            <a:ext cx="3373755" cy="650875"/>
+          </a:xfrm>
+        </p:spPr>
+        <p:txBody>
+          <a:bodyPr anchor="ctr">
+            <a:normAutofit/>
+          </a:bodyPr>
+          <a:lstStyle/>
+          <a:p>
+            <a:pPr lvl="0">
+              <a:defRPr/>
+            </a:pPr>
+            <a:r>
+              <a:rPr lang="ko-KR" altLang="en-US" sz="2800" smtClean="0"/>
+              <a:t>패키지 다이어그램</a:t>
+            </a:r>
+            <a:endParaRPr lang="ko-KR" altLang="en-US" sz="2800"/>
+          </a:p>
+        </p:txBody>
+      </p:sp>
+      <p:sp>
+        <p:nvSpPr>
+          <p:cNvPr id="12" name="텍스트 개체 틀 4"/>
+          <p:cNvSpPr>
+            <a:spLocks noGrp="1"/>
+          </p:cNvSpPr>
+          <p:nvPr>
+            <p:ph type="body" sz="half" idx="2"/>
+          </p:nvPr>
+        </p:nvSpPr>
+        <p:spPr>
+          <a:xfrm>
+            <a:off x="3424555" y="0"/>
+            <a:ext cx="3931920" cy="650875"/>
+          </a:xfrm>
+        </p:spPr>
+        <p:txBody>
+          <a:bodyPr anchor="ctr">
+            <a:normAutofit/>
+          </a:bodyPr>
+          <a:lstStyle/>
+          <a:p>
+            <a:pPr lvl="0">
+              <a:defRPr/>
+            </a:pPr>
+            <a:r>
+              <a:rPr lang="en-US" altLang="ko-KR" smtClean="0"/>
+              <a:t>User</a:t>
+            </a:r>
+            <a:endParaRPr lang="ko-KR" altLang="en-US"/>
+          </a:p>
+        </p:txBody>
+      </p:sp>
     </p:spTree>
     <p:extLst>
       <p:ext uri="{BB962C8B-B14F-4D97-AF65-F5344CB8AC3E}">
-        <p14:creationId xmlns:p14="http://schemas.microsoft.com/office/powerpoint/2010/main" val="693951829"/>
+        <p14:creationId xmlns:p14="http://schemas.microsoft.com/office/powerpoint/2010/main" val="2337712526"/>
       </p:ext>
     </p:extLst>
   </p:cSld>
   <p:clrMapOvr>
     <a:masterClrMapping/>
   </p:clrMapOvr>
-  <mc:AlternateContent xmlns:mc="http://schemas.openxmlformats.org/markup-compatibility/2006" xmlns:p14="http://schemas.microsoft.com/office/powerpoint/2010/main">
-    <mc:Choice Requires="p14">
-      <p:transition spd="slow" p14:dur="2000"/>
-    </mc:Choice>
-    <mc:Fallback xmlns="">
-      <p:transition spd="slow"/>
-    </mc:Fallback>
-  </mc:AlternateContent>
+  <p:transition/>
   <p:timing>
     <p:tnLst>
       <p:par>
@@ -6634,7 +5353,7 @@
             </a:pPr>
             <a:r>
               <a:rPr lang="ko-KR" altLang="en-US" sz="2800" smtClean="0"/>
-              <a:t>클래스 다이어그램</a:t>
+              <a:t>패키지 다이어그램</a:t>
             </a:r>
             <a:endParaRPr lang="ko-KR" altLang="en-US" sz="2800"/>
           </a:p>
@@ -6642,7 +5361,7 @@
       </p:sp>
       <p:sp>
         <p:nvSpPr>
-          <p:cNvPr id="5" name="텍스트 개체 틀 4"/>
+          <p:cNvPr id="12" name="텍스트 개체 틀 4"/>
           <p:cNvSpPr>
             <a:spLocks noGrp="1"/>
           </p:cNvSpPr>
@@ -6673,51 +5392,10 @@
           </a:p>
         </p:txBody>
       </p:sp>
-      <p:pic>
-        <p:nvPicPr>
-          <p:cNvPr id="1026" name="Picture 2" descr="C:\Users\DongKyun\Documents\GitHub\KHFinalProject\보고서\클래스\user클래스.jpg"/>
-          <p:cNvPicPr>
-            <a:picLocks noChangeAspect="1" noChangeArrowheads="1"/>
-          </p:cNvPicPr>
-          <p:nvPr/>
-        </p:nvPicPr>
-        <p:blipFill>
-          <a:blip r:embed="rId2">
-            <a:extLst>
-              <a:ext uri="{28A0092B-C50C-407E-A947-70E740481C1C}">
-                <a14:useLocalDpi xmlns:a14="http://schemas.microsoft.com/office/drawing/2010/main" val="0"/>
-              </a:ext>
-            </a:extLst>
-          </a:blip>
-          <a:srcRect/>
-          <a:stretch>
-            <a:fillRect/>
-          </a:stretch>
-        </p:blipFill>
-        <p:spPr bwMode="auto">
-          <a:xfrm>
-            <a:off x="733425" y="787400"/>
-            <a:ext cx="10839450" cy="5969000"/>
-          </a:xfrm>
-          <a:prstGeom prst="rect">
-            <a:avLst/>
-          </a:prstGeom>
-          <a:noFill/>
-          <a:extLst>
-            <a:ext uri="{909E8E84-426E-40DD-AFC4-6F175D3DCCD1}">
-              <a14:hiddenFill xmlns:a14="http://schemas.microsoft.com/office/drawing/2010/main">
-                <a:solidFill>
-                  <a:srgbClr val="FFFFFF"/>
-                </a:solidFill>
-              </a14:hiddenFill>
-            </a:ext>
-          </a:extLst>
-        </p:spPr>
-      </p:pic>
     </p:spTree>
     <p:extLst>
       <p:ext uri="{BB962C8B-B14F-4D97-AF65-F5344CB8AC3E}">
-        <p14:creationId xmlns:p14="http://schemas.microsoft.com/office/powerpoint/2010/main" val="1953278713"/>
+        <p14:creationId xmlns:p14="http://schemas.microsoft.com/office/powerpoint/2010/main" val="3024726558"/>
       </p:ext>
     </p:extLst>
   </p:cSld>
@@ -6779,7 +5457,7 @@
             </a:pPr>
             <a:r>
               <a:rPr lang="ko-KR" altLang="en-US" sz="2800" smtClean="0"/>
-              <a:t>클래스 다이어그램</a:t>
+              <a:t>패키지 다이어그램</a:t>
             </a:r>
             <a:endParaRPr lang="ko-KR" altLang="en-US" sz="2800"/>
           </a:p>
@@ -6787,7 +5465,7 @@
       </p:sp>
       <p:sp>
         <p:nvSpPr>
-          <p:cNvPr id="5" name="텍스트 개체 틀 4"/>
+          <p:cNvPr id="12" name="텍스트 개체 틀 4"/>
           <p:cNvSpPr>
             <a:spLocks noGrp="1"/>
           </p:cNvSpPr>
@@ -6812,57 +5490,16 @@
             </a:pPr>
             <a:r>
               <a:rPr lang="en-US" altLang="ko-KR" smtClean="0"/>
-              <a:t>Admin</a:t>
+              <a:t>User</a:t>
             </a:r>
             <a:endParaRPr lang="ko-KR" altLang="en-US"/>
           </a:p>
         </p:txBody>
       </p:sp>
-      <p:pic>
-        <p:nvPicPr>
-          <p:cNvPr id="2050" name="Picture 2" descr="C:\Users\DongKyun\Documents\GitHub\KHFinalProject\보고서\클래스\admin클래스.jpg"/>
-          <p:cNvPicPr>
-            <a:picLocks noChangeAspect="1" noChangeArrowheads="1"/>
-          </p:cNvPicPr>
-          <p:nvPr/>
-        </p:nvPicPr>
-        <p:blipFill>
-          <a:blip r:embed="rId2">
-            <a:extLst>
-              <a:ext uri="{28A0092B-C50C-407E-A947-70E740481C1C}">
-                <a14:useLocalDpi xmlns:a14="http://schemas.microsoft.com/office/drawing/2010/main" val="0"/>
-              </a:ext>
-            </a:extLst>
-          </a:blip>
-          <a:srcRect/>
-          <a:stretch>
-            <a:fillRect/>
-          </a:stretch>
-        </p:blipFill>
-        <p:spPr bwMode="auto">
-          <a:xfrm>
-            <a:off x="2057400" y="746124"/>
-            <a:ext cx="7620000" cy="5991225"/>
-          </a:xfrm>
-          <a:prstGeom prst="rect">
-            <a:avLst/>
-          </a:prstGeom>
-          <a:noFill/>
-          <a:extLst>
-            <a:ext uri="{909E8E84-426E-40DD-AFC4-6F175D3DCCD1}">
-              <a14:hiddenFill xmlns:a14="http://schemas.microsoft.com/office/drawing/2010/main">
-                <a:solidFill>
-                  <a:srgbClr val="FFFFFF"/>
-                </a:solidFill>
-              </a14:hiddenFill>
-            </a:ext>
-          </a:extLst>
-        </p:spPr>
-      </p:pic>
     </p:spTree>
     <p:extLst>
       <p:ext uri="{BB962C8B-B14F-4D97-AF65-F5344CB8AC3E}">
-        <p14:creationId xmlns:p14="http://schemas.microsoft.com/office/powerpoint/2010/main" val="4112727436"/>
+        <p14:creationId xmlns:p14="http://schemas.microsoft.com/office/powerpoint/2010/main" val="4041848743"/>
       </p:ext>
     </p:extLst>
   </p:cSld>
@@ -6924,7 +5561,7 @@
             </a:pPr>
             <a:r>
               <a:rPr lang="ko-KR" altLang="en-US" sz="2800" smtClean="0"/>
-              <a:t>클래스 다이어그램</a:t>
+              <a:t>패키지 다이어그램</a:t>
             </a:r>
             <a:endParaRPr lang="ko-KR" altLang="en-US" sz="2800"/>
           </a:p>
@@ -6932,7 +5569,7 @@
       </p:sp>
       <p:sp>
         <p:nvSpPr>
-          <p:cNvPr id="5" name="텍스트 개체 틀 4"/>
+          <p:cNvPr id="12" name="텍스트 개체 틀 4"/>
           <p:cNvSpPr>
             <a:spLocks noGrp="1"/>
           </p:cNvSpPr>
@@ -6957,57 +5594,16 @@
             </a:pPr>
             <a:r>
               <a:rPr lang="en-US" altLang="ko-KR" smtClean="0"/>
-              <a:t>Gym</a:t>
+              <a:t>User</a:t>
             </a:r>
             <a:endParaRPr lang="ko-KR" altLang="en-US"/>
           </a:p>
         </p:txBody>
       </p:sp>
-      <p:pic>
-        <p:nvPicPr>
-          <p:cNvPr id="3074" name="Picture 2" descr="C:\Users\DongKyun\Documents\GitHub\KHFinalProject\보고서\클래스\gym클래스.jpg"/>
-          <p:cNvPicPr>
-            <a:picLocks noChangeAspect="1" noChangeArrowheads="1"/>
-          </p:cNvPicPr>
-          <p:nvPr/>
-        </p:nvPicPr>
-        <p:blipFill>
-          <a:blip r:embed="rId2">
-            <a:extLst>
-              <a:ext uri="{28A0092B-C50C-407E-A947-70E740481C1C}">
-                <a14:useLocalDpi xmlns:a14="http://schemas.microsoft.com/office/drawing/2010/main" val="0"/>
-              </a:ext>
-            </a:extLst>
-          </a:blip>
-          <a:srcRect/>
-          <a:stretch>
-            <a:fillRect/>
-          </a:stretch>
-        </p:blipFill>
-        <p:spPr bwMode="auto">
-          <a:xfrm>
-            <a:off x="698500" y="1044575"/>
-            <a:ext cx="10909300" cy="5283200"/>
-          </a:xfrm>
-          <a:prstGeom prst="rect">
-            <a:avLst/>
-          </a:prstGeom>
-          <a:noFill/>
-          <a:extLst>
-            <a:ext uri="{909E8E84-426E-40DD-AFC4-6F175D3DCCD1}">
-              <a14:hiddenFill xmlns:a14="http://schemas.microsoft.com/office/drawing/2010/main">
-                <a:solidFill>
-                  <a:srgbClr val="FFFFFF"/>
-                </a:solidFill>
-              </a14:hiddenFill>
-            </a:ext>
-          </a:extLst>
-        </p:spPr>
-      </p:pic>
     </p:spTree>
     <p:extLst>
       <p:ext uri="{BB962C8B-B14F-4D97-AF65-F5344CB8AC3E}">
-        <p14:creationId xmlns:p14="http://schemas.microsoft.com/office/powerpoint/2010/main" val="2869662868"/>
+        <p14:creationId xmlns:p14="http://schemas.microsoft.com/office/powerpoint/2010/main" val="4207126397"/>
       </p:ext>
     </p:extLst>
   </p:cSld>
@@ -7069,7 +5665,7 @@
             </a:pPr>
             <a:r>
               <a:rPr lang="ko-KR" altLang="en-US" sz="2800" smtClean="0"/>
-              <a:t>클래스 다이어그램</a:t>
+              <a:t>패키지 다이어그램</a:t>
             </a:r>
             <a:endParaRPr lang="ko-KR" altLang="en-US" sz="2800"/>
           </a:p>
@@ -7077,7 +5673,7 @@
       </p:sp>
       <p:sp>
         <p:nvSpPr>
-          <p:cNvPr id="5" name="텍스트 개체 틀 4"/>
+          <p:cNvPr id="12" name="텍스트 개체 틀 4"/>
           <p:cNvSpPr>
             <a:spLocks noGrp="1"/>
           </p:cNvSpPr>
@@ -7102,57 +5698,16 @@
             </a:pPr>
             <a:r>
               <a:rPr lang="en-US" altLang="ko-KR" smtClean="0"/>
-              <a:t>Health</a:t>
+              <a:t>User</a:t>
             </a:r>
             <a:endParaRPr lang="ko-KR" altLang="en-US"/>
           </a:p>
         </p:txBody>
       </p:sp>
-      <p:pic>
-        <p:nvPicPr>
-          <p:cNvPr id="4098" name="Picture 2" descr="C:\Users\DongKyun\Documents\GitHub\KHFinalProject\보고서\클래스\health클래스.jpg"/>
-          <p:cNvPicPr>
-            <a:picLocks noChangeAspect="1" noChangeArrowheads="1"/>
-          </p:cNvPicPr>
-          <p:nvPr/>
-        </p:nvPicPr>
-        <p:blipFill>
-          <a:blip r:embed="rId2">
-            <a:extLst>
-              <a:ext uri="{28A0092B-C50C-407E-A947-70E740481C1C}">
-                <a14:useLocalDpi xmlns:a14="http://schemas.microsoft.com/office/drawing/2010/main" val="0"/>
-              </a:ext>
-            </a:extLst>
-          </a:blip>
-          <a:srcRect/>
-          <a:stretch>
-            <a:fillRect/>
-          </a:stretch>
-        </p:blipFill>
-        <p:spPr bwMode="auto">
-          <a:xfrm>
-            <a:off x="1908175" y="1949450"/>
-            <a:ext cx="8166100" cy="3225800"/>
-          </a:xfrm>
-          <a:prstGeom prst="rect">
-            <a:avLst/>
-          </a:prstGeom>
-          <a:noFill/>
-          <a:extLst>
-            <a:ext uri="{909E8E84-426E-40DD-AFC4-6F175D3DCCD1}">
-              <a14:hiddenFill xmlns:a14="http://schemas.microsoft.com/office/drawing/2010/main">
-                <a:solidFill>
-                  <a:srgbClr val="FFFFFF"/>
-                </a:solidFill>
-              </a14:hiddenFill>
-            </a:ext>
-          </a:extLst>
-        </p:spPr>
-      </p:pic>
     </p:spTree>
     <p:extLst>
       <p:ext uri="{BB962C8B-B14F-4D97-AF65-F5344CB8AC3E}">
-        <p14:creationId xmlns:p14="http://schemas.microsoft.com/office/powerpoint/2010/main" val="28708698"/>
+        <p14:creationId xmlns:p14="http://schemas.microsoft.com/office/powerpoint/2010/main" val="1635299214"/>
       </p:ext>
     </p:extLst>
   </p:cSld>

</xml_diff>